<commit_message>
reserch question is uptodate
</commit_message>
<xml_diff>
--- a/reseach_question_presentation_template (1).pptx
+++ b/reseach_question_presentation_template (1).pptx
@@ -187,7 +187,7 @@
           <p:cNvPr id="2" name="Header Placeholder 1">
             <a:extLst>
               <a:ext uri="{FF2B5EF4-FFF2-40B4-BE49-F238E27FC236}">
-                <a16:creationId xmlns:a16="http://schemas.microsoft.com/office/drawing/2014/main" xmlns="" id="{898966F2-21A1-4B2B-ADA6-AD0BB447B7CB}"/>
+                <a16:creationId xmlns="" xmlns:a16="http://schemas.microsoft.com/office/drawing/2014/main" id="{898966F2-21A1-4B2B-ADA6-AD0BB447B7CB}"/>
               </a:ext>
             </a:extLst>
           </p:cNvPr>
@@ -224,7 +224,7 @@
           <p:cNvPr id="3" name="Date Placeholder 2">
             <a:extLst>
               <a:ext uri="{FF2B5EF4-FFF2-40B4-BE49-F238E27FC236}">
-                <a16:creationId xmlns:a16="http://schemas.microsoft.com/office/drawing/2014/main" xmlns="" id="{751468BB-CDF2-4507-B4EF-7B369D307A4D}"/>
+                <a16:creationId xmlns="" xmlns:a16="http://schemas.microsoft.com/office/drawing/2014/main" id="{751468BB-CDF2-4507-B4EF-7B369D307A4D}"/>
               </a:ext>
             </a:extLst>
           </p:cNvPr>
@@ -255,7 +255,7 @@
             <a:fld id="{93FAAC3A-BD1F-4A00-9099-74B95789FE00}" type="datetimeFigureOut">
               <a:rPr lang="en-GB" smtClean="0"/>
               <a:pPr/>
-              <a:t>11/11/2024</a:t>
+              <a:t>17/11/2024</a:t>
             </a:fld>
             <a:endParaRPr lang="en-GB"/>
           </a:p>
@@ -266,7 +266,7 @@
           <p:cNvPr id="4" name="Footer Placeholder 3">
             <a:extLst>
               <a:ext uri="{FF2B5EF4-FFF2-40B4-BE49-F238E27FC236}">
-                <a16:creationId xmlns:a16="http://schemas.microsoft.com/office/drawing/2014/main" xmlns="" id="{904BCF7D-6037-48D3-84E5-56B8B0552143}"/>
+                <a16:creationId xmlns="" xmlns:a16="http://schemas.microsoft.com/office/drawing/2014/main" id="{904BCF7D-6037-48D3-84E5-56B8B0552143}"/>
               </a:ext>
             </a:extLst>
           </p:cNvPr>
@@ -303,7 +303,7 @@
           <p:cNvPr id="5" name="Slide Number Placeholder 4">
             <a:extLst>
               <a:ext uri="{FF2B5EF4-FFF2-40B4-BE49-F238E27FC236}">
-                <a16:creationId xmlns:a16="http://schemas.microsoft.com/office/drawing/2014/main" xmlns="" id="{D619E732-656C-4BB5-ACCB-1568C5C66DD7}"/>
+                <a16:creationId xmlns="" xmlns:a16="http://schemas.microsoft.com/office/drawing/2014/main" id="{D619E732-656C-4BB5-ACCB-1568C5C66DD7}"/>
               </a:ext>
             </a:extLst>
           </p:cNvPr>
@@ -434,7 +434,7 @@
             <a:fld id="{8E359C8A-39F6-4045-9163-4042C4C26B15}" type="datetimeFigureOut">
               <a:rPr lang="en-GB" smtClean="0"/>
               <a:pPr/>
-              <a:t>11/11/2024</a:t>
+              <a:t>17/11/2024</a:t>
             </a:fld>
             <a:endParaRPr lang="en-GB"/>
           </a:p>
@@ -929,7 +929,7 @@
           <p:cNvPr id="4" name="Picture 3" descr="University of Hertfordshire logo">
             <a:extLst>
               <a:ext uri="{FF2B5EF4-FFF2-40B4-BE49-F238E27FC236}">
-                <a16:creationId xmlns:a16="http://schemas.microsoft.com/office/drawing/2014/main" xmlns="" id="{16E4BB13-0D32-AA4A-BF91-2B76A7C18242}"/>
+                <a16:creationId xmlns="" xmlns:a16="http://schemas.microsoft.com/office/drawing/2014/main" id="{16E4BB13-0D32-AA4A-BF91-2B76A7C18242}"/>
               </a:ext>
             </a:extLst>
           </p:cNvPr>
@@ -1003,7 +1003,7 @@
           <p:cNvPr id="3" name="Picture Placeholder 2">
             <a:extLst>
               <a:ext uri="{FF2B5EF4-FFF2-40B4-BE49-F238E27FC236}">
-                <a16:creationId xmlns:a16="http://schemas.microsoft.com/office/drawing/2014/main" xmlns="" id="{A307C322-846C-9045-AD91-A93C82FC5AAF}"/>
+                <a16:creationId xmlns="" xmlns:a16="http://schemas.microsoft.com/office/drawing/2014/main" id="{A307C322-846C-9045-AD91-A93C82FC5AAF}"/>
               </a:ext>
             </a:extLst>
           </p:cNvPr>
@@ -1082,7 +1082,7 @@
           <p:cNvPr id="9" name="Media Placeholder 8">
             <a:extLst>
               <a:ext uri="{FF2B5EF4-FFF2-40B4-BE49-F238E27FC236}">
-                <a16:creationId xmlns:a16="http://schemas.microsoft.com/office/drawing/2014/main" xmlns="" id="{9ABCF9A5-761F-434B-BBB5-D788CB1E79D8}"/>
+                <a16:creationId xmlns="" xmlns:a16="http://schemas.microsoft.com/office/drawing/2014/main" id="{9ABCF9A5-761F-434B-BBB5-D788CB1E79D8}"/>
               </a:ext>
             </a:extLst>
           </p:cNvPr>
@@ -1153,7 +1153,7 @@
           <p:cNvPr id="5" name="Footer Placeholder 4">
             <a:extLst>
               <a:ext uri="{FF2B5EF4-FFF2-40B4-BE49-F238E27FC236}">
-                <a16:creationId xmlns:a16="http://schemas.microsoft.com/office/drawing/2014/main" xmlns="" id="{962B6D5D-0892-4B4E-86D9-894852B1242C}"/>
+                <a16:creationId xmlns="" xmlns:a16="http://schemas.microsoft.com/office/drawing/2014/main" id="{962B6D5D-0892-4B4E-86D9-894852B1242C}"/>
               </a:ext>
             </a:extLst>
           </p:cNvPr>
@@ -1181,7 +1181,7 @@
           <p:cNvPr id="6" name="Slide Number Placeholder 5">
             <a:extLst>
               <a:ext uri="{FF2B5EF4-FFF2-40B4-BE49-F238E27FC236}">
-                <a16:creationId xmlns:a16="http://schemas.microsoft.com/office/drawing/2014/main" xmlns="" id="{3B7428FC-C061-4730-9EA5-A52A00413991}"/>
+                <a16:creationId xmlns="" xmlns:a16="http://schemas.microsoft.com/office/drawing/2014/main" id="{3B7428FC-C061-4730-9EA5-A52A00413991}"/>
               </a:ext>
             </a:extLst>
           </p:cNvPr>
@@ -1211,7 +1211,7 @@
           <p:cNvPr id="7" name="Rectangle 6">
             <a:extLst>
               <a:ext uri="{FF2B5EF4-FFF2-40B4-BE49-F238E27FC236}">
-                <a16:creationId xmlns:a16="http://schemas.microsoft.com/office/drawing/2014/main" xmlns="" id="{850AA271-B0BA-42CD-A544-17AAB1FA2EEA}"/>
+                <a16:creationId xmlns="" xmlns:a16="http://schemas.microsoft.com/office/drawing/2014/main" id="{850AA271-B0BA-42CD-A544-17AAB1FA2EEA}"/>
               </a:ext>
             </a:extLst>
           </p:cNvPr>
@@ -1263,7 +1263,7 @@
           <p:cNvPr id="16" name="Content Placeholder 2">
             <a:extLst>
               <a:ext uri="{FF2B5EF4-FFF2-40B4-BE49-F238E27FC236}">
-                <a16:creationId xmlns:a16="http://schemas.microsoft.com/office/drawing/2014/main" xmlns="" id="{699880E3-4DE3-A642-9738-DF49DDCC9AC5}"/>
+                <a16:creationId xmlns="" xmlns:a16="http://schemas.microsoft.com/office/drawing/2014/main" id="{699880E3-4DE3-A642-9738-DF49DDCC9AC5}"/>
               </a:ext>
             </a:extLst>
           </p:cNvPr>
@@ -1320,7 +1320,7 @@
           <p:cNvPr id="17" name="Content Placeholder 2">
             <a:extLst>
               <a:ext uri="{FF2B5EF4-FFF2-40B4-BE49-F238E27FC236}">
-                <a16:creationId xmlns:a16="http://schemas.microsoft.com/office/drawing/2014/main" xmlns="" id="{CF37D495-D835-8E4B-A177-5E12F893DDCA}"/>
+                <a16:creationId xmlns="" xmlns:a16="http://schemas.microsoft.com/office/drawing/2014/main" id="{CF37D495-D835-8E4B-A177-5E12F893DDCA}"/>
               </a:ext>
             </a:extLst>
           </p:cNvPr>
@@ -1412,7 +1412,7 @@
           <p:cNvPr id="18" name="Content Placeholder 2">
             <a:extLst>
               <a:ext uri="{FF2B5EF4-FFF2-40B4-BE49-F238E27FC236}">
-                <a16:creationId xmlns:a16="http://schemas.microsoft.com/office/drawing/2014/main" xmlns="" id="{A6804C7E-983C-9246-90C0-AF8A0CE2CA84}"/>
+                <a16:creationId xmlns="" xmlns:a16="http://schemas.microsoft.com/office/drawing/2014/main" id="{A6804C7E-983C-9246-90C0-AF8A0CE2CA84}"/>
               </a:ext>
             </a:extLst>
           </p:cNvPr>
@@ -1503,7 +1503,7 @@
           <p:cNvPr id="8" name="Picture Placeholder 7">
             <a:extLst>
               <a:ext uri="{FF2B5EF4-FFF2-40B4-BE49-F238E27FC236}">
-                <a16:creationId xmlns:a16="http://schemas.microsoft.com/office/drawing/2014/main" xmlns="" id="{84410427-8F1D-7541-9C05-AFDD3531678D}"/>
+                <a16:creationId xmlns="" xmlns:a16="http://schemas.microsoft.com/office/drawing/2014/main" id="{84410427-8F1D-7541-9C05-AFDD3531678D}"/>
               </a:ext>
             </a:extLst>
           </p:cNvPr>
@@ -1533,7 +1533,7 @@
           <p:cNvPr id="20" name="Picture Placeholder 7">
             <a:extLst>
               <a:ext uri="{FF2B5EF4-FFF2-40B4-BE49-F238E27FC236}">
-                <a16:creationId xmlns:a16="http://schemas.microsoft.com/office/drawing/2014/main" xmlns="" id="{8B7D5964-7A97-5742-8717-CCB747F84A08}"/>
+                <a16:creationId xmlns="" xmlns:a16="http://schemas.microsoft.com/office/drawing/2014/main" id="{8B7D5964-7A97-5742-8717-CCB747F84A08}"/>
               </a:ext>
             </a:extLst>
           </p:cNvPr>
@@ -1563,7 +1563,7 @@
           <p:cNvPr id="21" name="Picture Placeholder 7">
             <a:extLst>
               <a:ext uri="{FF2B5EF4-FFF2-40B4-BE49-F238E27FC236}">
-                <a16:creationId xmlns:a16="http://schemas.microsoft.com/office/drawing/2014/main" xmlns="" id="{344933FE-A401-A841-9AC3-B75285AA32D2}"/>
+                <a16:creationId xmlns="" xmlns:a16="http://schemas.microsoft.com/office/drawing/2014/main" id="{344933FE-A401-A841-9AC3-B75285AA32D2}"/>
               </a:ext>
             </a:extLst>
           </p:cNvPr>
@@ -1631,7 +1631,7 @@
           <p:cNvPr id="7" name="Picture 6">
             <a:extLst>
               <a:ext uri="{FF2B5EF4-FFF2-40B4-BE49-F238E27FC236}">
-                <a16:creationId xmlns:a16="http://schemas.microsoft.com/office/drawing/2014/main" xmlns="" id="{EE2CE188-32E7-4242-9E44-E8055FC030CC}"/>
+                <a16:creationId xmlns="" xmlns:a16="http://schemas.microsoft.com/office/drawing/2014/main" id="{EE2CE188-32E7-4242-9E44-E8055FC030CC}"/>
               </a:ext>
             </a:extLst>
           </p:cNvPr>
@@ -1666,7 +1666,7 @@
           <p:cNvPr id="2" name="Title 1">
             <a:extLst>
               <a:ext uri="{FF2B5EF4-FFF2-40B4-BE49-F238E27FC236}">
-                <a16:creationId xmlns:a16="http://schemas.microsoft.com/office/drawing/2014/main" xmlns="" id="{7381B53D-9933-445F-9B68-E730EB38A5A9}"/>
+                <a16:creationId xmlns="" xmlns:a16="http://schemas.microsoft.com/office/drawing/2014/main" id="{7381B53D-9933-445F-9B68-E730EB38A5A9}"/>
               </a:ext>
             </a:extLst>
           </p:cNvPr>
@@ -1718,7 +1718,7 @@
           <p:cNvPr id="5" name="Footer Placeholder 4">
             <a:extLst>
               <a:ext uri="{FF2B5EF4-FFF2-40B4-BE49-F238E27FC236}">
-                <a16:creationId xmlns:a16="http://schemas.microsoft.com/office/drawing/2014/main" xmlns="" id="{CA2BE80A-BFEC-E24A-B510-73A571F1F04F}"/>
+                <a16:creationId xmlns="" xmlns:a16="http://schemas.microsoft.com/office/drawing/2014/main" id="{CA2BE80A-BFEC-E24A-B510-73A571F1F04F}"/>
               </a:ext>
             </a:extLst>
           </p:cNvPr>
@@ -1766,7 +1766,7 @@
           <p:cNvPr id="6" name="Slide Number Placeholder 5">
             <a:extLst>
               <a:ext uri="{FF2B5EF4-FFF2-40B4-BE49-F238E27FC236}">
-                <a16:creationId xmlns:a16="http://schemas.microsoft.com/office/drawing/2014/main" xmlns="" id="{8E5B25B4-144A-5B4A-8EAD-2022412DF2F1}"/>
+                <a16:creationId xmlns="" xmlns:a16="http://schemas.microsoft.com/office/drawing/2014/main" id="{8E5B25B4-144A-5B4A-8EAD-2022412DF2F1}"/>
               </a:ext>
             </a:extLst>
           </p:cNvPr>
@@ -1849,7 +1849,7 @@
           <p:cNvPr id="2" name="Title 1">
             <a:extLst>
               <a:ext uri="{FF2B5EF4-FFF2-40B4-BE49-F238E27FC236}">
-                <a16:creationId xmlns:a16="http://schemas.microsoft.com/office/drawing/2014/main" xmlns="" id="{7381B53D-9933-445F-9B68-E730EB38A5A9}"/>
+                <a16:creationId xmlns="" xmlns:a16="http://schemas.microsoft.com/office/drawing/2014/main" id="{7381B53D-9933-445F-9B68-E730EB38A5A9}"/>
               </a:ext>
             </a:extLst>
           </p:cNvPr>
@@ -1896,7 +1896,7 @@
           <p:cNvPr id="3" name="Subtitle 2">
             <a:extLst>
               <a:ext uri="{FF2B5EF4-FFF2-40B4-BE49-F238E27FC236}">
-                <a16:creationId xmlns:a16="http://schemas.microsoft.com/office/drawing/2014/main" xmlns="" id="{E2C6B9F5-608F-4534-96F0-C3A5E1A638A6}"/>
+                <a16:creationId xmlns="" xmlns:a16="http://schemas.microsoft.com/office/drawing/2014/main" id="{E2C6B9F5-608F-4534-96F0-C3A5E1A638A6}"/>
               </a:ext>
             </a:extLst>
           </p:cNvPr>
@@ -1973,7 +1973,7 @@
           <p:cNvPr id="5" name="Footer Placeholder 4">
             <a:extLst>
               <a:ext uri="{FF2B5EF4-FFF2-40B4-BE49-F238E27FC236}">
-                <a16:creationId xmlns:a16="http://schemas.microsoft.com/office/drawing/2014/main" xmlns="" id="{0540E7B9-9AC6-4E42-A931-6FF91E6494A1}"/>
+                <a16:creationId xmlns="" xmlns:a16="http://schemas.microsoft.com/office/drawing/2014/main" id="{0540E7B9-9AC6-4E42-A931-6FF91E6494A1}"/>
               </a:ext>
             </a:extLst>
           </p:cNvPr>
@@ -2021,7 +2021,7 @@
           <p:cNvPr id="6" name="Slide Number Placeholder 5">
             <a:extLst>
               <a:ext uri="{FF2B5EF4-FFF2-40B4-BE49-F238E27FC236}">
-                <a16:creationId xmlns:a16="http://schemas.microsoft.com/office/drawing/2014/main" xmlns="" id="{FB16D645-6420-4785-8316-43EF780FA589}"/>
+                <a16:creationId xmlns="" xmlns:a16="http://schemas.microsoft.com/office/drawing/2014/main" id="{FB16D645-6420-4785-8316-43EF780FA589}"/>
               </a:ext>
             </a:extLst>
           </p:cNvPr>
@@ -2066,7 +2066,7 @@
           <p:cNvPr id="8" name="Picture 7" descr="A picture containing drawing&#10;&#10;Description automatically generated">
             <a:extLst>
               <a:ext uri="{FF2B5EF4-FFF2-40B4-BE49-F238E27FC236}">
-                <a16:creationId xmlns:a16="http://schemas.microsoft.com/office/drawing/2014/main" xmlns="" id="{BCCF2CA0-CCE3-4304-8F31-4D1CC50BCBDE}"/>
+                <a16:creationId xmlns="" xmlns:a16="http://schemas.microsoft.com/office/drawing/2014/main" id="{BCCF2CA0-CCE3-4304-8F31-4D1CC50BCBDE}"/>
               </a:ext>
             </a:extLst>
           </p:cNvPr>
@@ -2140,7 +2140,7 @@
           <p:cNvPr id="3" name="Subtitle 2">
             <a:extLst>
               <a:ext uri="{FF2B5EF4-FFF2-40B4-BE49-F238E27FC236}">
-                <a16:creationId xmlns:a16="http://schemas.microsoft.com/office/drawing/2014/main" xmlns="" id="{E2C6B9F5-608F-4534-96F0-C3A5E1A638A6}"/>
+                <a16:creationId xmlns="" xmlns:a16="http://schemas.microsoft.com/office/drawing/2014/main" id="{E2C6B9F5-608F-4534-96F0-C3A5E1A638A6}"/>
               </a:ext>
             </a:extLst>
           </p:cNvPr>
@@ -2217,7 +2217,7 @@
           <p:cNvPr id="5" name="Footer Placeholder 4">
             <a:extLst>
               <a:ext uri="{FF2B5EF4-FFF2-40B4-BE49-F238E27FC236}">
-                <a16:creationId xmlns:a16="http://schemas.microsoft.com/office/drawing/2014/main" xmlns="" id="{0540E7B9-9AC6-4E42-A931-6FF91E6494A1}"/>
+                <a16:creationId xmlns="" xmlns:a16="http://schemas.microsoft.com/office/drawing/2014/main" id="{0540E7B9-9AC6-4E42-A931-6FF91E6494A1}"/>
               </a:ext>
             </a:extLst>
           </p:cNvPr>
@@ -2260,7 +2260,7 @@
           <p:cNvPr id="6" name="Slide Number Placeholder 5">
             <a:extLst>
               <a:ext uri="{FF2B5EF4-FFF2-40B4-BE49-F238E27FC236}">
-                <a16:creationId xmlns:a16="http://schemas.microsoft.com/office/drawing/2014/main" xmlns="" id="{FB16D645-6420-4785-8316-43EF780FA589}"/>
+                <a16:creationId xmlns="" xmlns:a16="http://schemas.microsoft.com/office/drawing/2014/main" id="{FB16D645-6420-4785-8316-43EF780FA589}"/>
               </a:ext>
             </a:extLst>
           </p:cNvPr>
@@ -2305,7 +2305,7 @@
           <p:cNvPr id="9" name="Title 1">
             <a:extLst>
               <a:ext uri="{FF2B5EF4-FFF2-40B4-BE49-F238E27FC236}">
-                <a16:creationId xmlns:a16="http://schemas.microsoft.com/office/drawing/2014/main" xmlns="" id="{E9449821-0D0D-644D-97A3-D56097A9C6DA}"/>
+                <a16:creationId xmlns="" xmlns:a16="http://schemas.microsoft.com/office/drawing/2014/main" id="{E9449821-0D0D-644D-97A3-D56097A9C6DA}"/>
               </a:ext>
             </a:extLst>
           </p:cNvPr>
@@ -2352,7 +2352,7 @@
           <p:cNvPr id="10" name="Rectangle 9">
             <a:extLst>
               <a:ext uri="{FF2B5EF4-FFF2-40B4-BE49-F238E27FC236}">
-                <a16:creationId xmlns:a16="http://schemas.microsoft.com/office/drawing/2014/main" xmlns="" id="{44F6EB17-8019-7B4E-B53C-76B057A7C31F}"/>
+                <a16:creationId xmlns="" xmlns:a16="http://schemas.microsoft.com/office/drawing/2014/main" id="{44F6EB17-8019-7B4E-B53C-76B057A7C31F}"/>
               </a:ext>
             </a:extLst>
           </p:cNvPr>
@@ -2408,7 +2408,7 @@
           <p:cNvPr id="11" name="Picture 10">
             <a:extLst>
               <a:ext uri="{FF2B5EF4-FFF2-40B4-BE49-F238E27FC236}">
-                <a16:creationId xmlns:a16="http://schemas.microsoft.com/office/drawing/2014/main" xmlns="" id="{0503EF50-F00F-9643-BE53-F0A5272FC4B2}"/>
+                <a16:creationId xmlns="" xmlns:a16="http://schemas.microsoft.com/office/drawing/2014/main" id="{0503EF50-F00F-9643-BE53-F0A5272FC4B2}"/>
               </a:ext>
             </a:extLst>
           </p:cNvPr>
@@ -2476,7 +2476,7 @@
           <p:cNvPr id="2" name="Title 1">
             <a:extLst>
               <a:ext uri="{FF2B5EF4-FFF2-40B4-BE49-F238E27FC236}">
-                <a16:creationId xmlns:a16="http://schemas.microsoft.com/office/drawing/2014/main" xmlns="" id="{A1AAFE49-0143-472F-897B-A7DAB87AB4E4}"/>
+                <a16:creationId xmlns="" xmlns:a16="http://schemas.microsoft.com/office/drawing/2014/main" id="{A1AAFE49-0143-472F-897B-A7DAB87AB4E4}"/>
               </a:ext>
             </a:extLst>
           </p:cNvPr>
@@ -2505,7 +2505,7 @@
           <p:cNvPr id="3" name="Content Placeholder 2">
             <a:extLst>
               <a:ext uri="{FF2B5EF4-FFF2-40B4-BE49-F238E27FC236}">
-                <a16:creationId xmlns:a16="http://schemas.microsoft.com/office/drawing/2014/main" xmlns="" id="{981FBDFA-876B-4255-A301-F62F1EDD8D66}"/>
+                <a16:creationId xmlns="" xmlns:a16="http://schemas.microsoft.com/office/drawing/2014/main" id="{981FBDFA-876B-4255-A301-F62F1EDD8D66}"/>
               </a:ext>
             </a:extLst>
           </p:cNvPr>
@@ -2565,7 +2565,7 @@
           <p:cNvPr id="4" name="Content Placeholder 3">
             <a:extLst>
               <a:ext uri="{FF2B5EF4-FFF2-40B4-BE49-F238E27FC236}">
-                <a16:creationId xmlns:a16="http://schemas.microsoft.com/office/drawing/2014/main" xmlns="" id="{46F0C709-1F3D-4B13-A290-4041A33FB10E}"/>
+                <a16:creationId xmlns="" xmlns:a16="http://schemas.microsoft.com/office/drawing/2014/main" id="{46F0C709-1F3D-4B13-A290-4041A33FB10E}"/>
               </a:ext>
             </a:extLst>
           </p:cNvPr>
@@ -2656,7 +2656,7 @@
           <p:cNvPr id="6" name="Footer Placeholder 5">
             <a:extLst>
               <a:ext uri="{FF2B5EF4-FFF2-40B4-BE49-F238E27FC236}">
-                <a16:creationId xmlns:a16="http://schemas.microsoft.com/office/drawing/2014/main" xmlns="" id="{60A8C9C5-E913-47B9-82DE-196768E6D657}"/>
+                <a16:creationId xmlns="" xmlns:a16="http://schemas.microsoft.com/office/drawing/2014/main" id="{60A8C9C5-E913-47B9-82DE-196768E6D657}"/>
               </a:ext>
             </a:extLst>
           </p:cNvPr>
@@ -2684,7 +2684,7 @@
           <p:cNvPr id="7" name="Slide Number Placeholder 6">
             <a:extLst>
               <a:ext uri="{FF2B5EF4-FFF2-40B4-BE49-F238E27FC236}">
-                <a16:creationId xmlns:a16="http://schemas.microsoft.com/office/drawing/2014/main" xmlns="" id="{E1558F66-ECA3-4B00-A383-8D2B86217C93}"/>
+                <a16:creationId xmlns="" xmlns:a16="http://schemas.microsoft.com/office/drawing/2014/main" id="{E1558F66-ECA3-4B00-A383-8D2B86217C93}"/>
               </a:ext>
             </a:extLst>
           </p:cNvPr>
@@ -2714,7 +2714,7 @@
           <p:cNvPr id="8" name="Rectangle 7">
             <a:extLst>
               <a:ext uri="{FF2B5EF4-FFF2-40B4-BE49-F238E27FC236}">
-                <a16:creationId xmlns:a16="http://schemas.microsoft.com/office/drawing/2014/main" xmlns="" id="{62A19DAE-53D8-4F04-A4B9-B6EDFC23886D}"/>
+                <a16:creationId xmlns="" xmlns:a16="http://schemas.microsoft.com/office/drawing/2014/main" id="{62A19DAE-53D8-4F04-A4B9-B6EDFC23886D}"/>
               </a:ext>
             </a:extLst>
           </p:cNvPr>
@@ -2829,7 +2829,7 @@
           <p:cNvPr id="2" name="Title 1">
             <a:extLst>
               <a:ext uri="{FF2B5EF4-FFF2-40B4-BE49-F238E27FC236}">
-                <a16:creationId xmlns:a16="http://schemas.microsoft.com/office/drawing/2014/main" xmlns="" id="{A4DE70B5-BA04-4DB3-853D-A1C05ADF828C}"/>
+                <a16:creationId xmlns="" xmlns:a16="http://schemas.microsoft.com/office/drawing/2014/main" id="{A4DE70B5-BA04-4DB3-853D-A1C05ADF828C}"/>
               </a:ext>
             </a:extLst>
           </p:cNvPr>
@@ -2858,7 +2858,7 @@
           <p:cNvPr id="3" name="Content Placeholder 2">
             <a:extLst>
               <a:ext uri="{FF2B5EF4-FFF2-40B4-BE49-F238E27FC236}">
-                <a16:creationId xmlns:a16="http://schemas.microsoft.com/office/drawing/2014/main" xmlns="" id="{70440712-862D-4568-80A4-86117B896766}"/>
+                <a16:creationId xmlns="" xmlns:a16="http://schemas.microsoft.com/office/drawing/2014/main" id="{70440712-862D-4568-80A4-86117B896766}"/>
               </a:ext>
             </a:extLst>
           </p:cNvPr>
@@ -2915,7 +2915,7 @@
           <p:cNvPr id="5" name="Footer Placeholder 4">
             <a:extLst>
               <a:ext uri="{FF2B5EF4-FFF2-40B4-BE49-F238E27FC236}">
-                <a16:creationId xmlns:a16="http://schemas.microsoft.com/office/drawing/2014/main" xmlns="" id="{962B6D5D-0892-4B4E-86D9-894852B1242C}"/>
+                <a16:creationId xmlns="" xmlns:a16="http://schemas.microsoft.com/office/drawing/2014/main" id="{962B6D5D-0892-4B4E-86D9-894852B1242C}"/>
               </a:ext>
             </a:extLst>
           </p:cNvPr>
@@ -2943,7 +2943,7 @@
           <p:cNvPr id="6" name="Slide Number Placeholder 5">
             <a:extLst>
               <a:ext uri="{FF2B5EF4-FFF2-40B4-BE49-F238E27FC236}">
-                <a16:creationId xmlns:a16="http://schemas.microsoft.com/office/drawing/2014/main" xmlns="" id="{3B7428FC-C061-4730-9EA5-A52A00413991}"/>
+                <a16:creationId xmlns="" xmlns:a16="http://schemas.microsoft.com/office/drawing/2014/main" id="{3B7428FC-C061-4730-9EA5-A52A00413991}"/>
               </a:ext>
             </a:extLst>
           </p:cNvPr>
@@ -2973,7 +2973,7 @@
           <p:cNvPr id="7" name="Rectangle 6">
             <a:extLst>
               <a:ext uri="{FF2B5EF4-FFF2-40B4-BE49-F238E27FC236}">
-                <a16:creationId xmlns:a16="http://schemas.microsoft.com/office/drawing/2014/main" xmlns="" id="{850AA271-B0BA-42CD-A544-17AAB1FA2EEA}"/>
+                <a16:creationId xmlns="" xmlns:a16="http://schemas.microsoft.com/office/drawing/2014/main" id="{850AA271-B0BA-42CD-A544-17AAB1FA2EEA}"/>
               </a:ext>
             </a:extLst>
           </p:cNvPr>
@@ -3063,7 +3063,7 @@
           <p:cNvPr id="2" name="Title 1">
             <a:extLst>
               <a:ext uri="{FF2B5EF4-FFF2-40B4-BE49-F238E27FC236}">
-                <a16:creationId xmlns:a16="http://schemas.microsoft.com/office/drawing/2014/main" xmlns="" id="{A4DE70B5-BA04-4DB3-853D-A1C05ADF828C}"/>
+                <a16:creationId xmlns="" xmlns:a16="http://schemas.microsoft.com/office/drawing/2014/main" id="{A4DE70B5-BA04-4DB3-853D-A1C05ADF828C}"/>
               </a:ext>
             </a:extLst>
           </p:cNvPr>
@@ -3097,7 +3097,7 @@
           <p:cNvPr id="3" name="Content Placeholder 2">
             <a:extLst>
               <a:ext uri="{FF2B5EF4-FFF2-40B4-BE49-F238E27FC236}">
-                <a16:creationId xmlns:a16="http://schemas.microsoft.com/office/drawing/2014/main" xmlns="" id="{70440712-862D-4568-80A4-86117B896766}"/>
+                <a16:creationId xmlns="" xmlns:a16="http://schemas.microsoft.com/office/drawing/2014/main" id="{70440712-862D-4568-80A4-86117B896766}"/>
               </a:ext>
             </a:extLst>
           </p:cNvPr>
@@ -3154,7 +3154,7 @@
           <p:cNvPr id="6" name="Slide Number Placeholder 5">
             <a:extLst>
               <a:ext uri="{FF2B5EF4-FFF2-40B4-BE49-F238E27FC236}">
-                <a16:creationId xmlns:a16="http://schemas.microsoft.com/office/drawing/2014/main" xmlns="" id="{3B7428FC-C061-4730-9EA5-A52A00413991}"/>
+                <a16:creationId xmlns="" xmlns:a16="http://schemas.microsoft.com/office/drawing/2014/main" id="{3B7428FC-C061-4730-9EA5-A52A00413991}"/>
               </a:ext>
             </a:extLst>
           </p:cNvPr>
@@ -3184,7 +3184,7 @@
           <p:cNvPr id="7" name="Rectangle 6">
             <a:extLst>
               <a:ext uri="{FF2B5EF4-FFF2-40B4-BE49-F238E27FC236}">
-                <a16:creationId xmlns:a16="http://schemas.microsoft.com/office/drawing/2014/main" xmlns="" id="{850AA271-B0BA-42CD-A544-17AAB1FA2EEA}"/>
+                <a16:creationId xmlns="" xmlns:a16="http://schemas.microsoft.com/office/drawing/2014/main" id="{850AA271-B0BA-42CD-A544-17AAB1FA2EEA}"/>
               </a:ext>
             </a:extLst>
           </p:cNvPr>
@@ -3274,7 +3274,7 @@
           <p:cNvPr id="6" name="Slide Number Placeholder 5">
             <a:extLst>
               <a:ext uri="{FF2B5EF4-FFF2-40B4-BE49-F238E27FC236}">
-                <a16:creationId xmlns:a16="http://schemas.microsoft.com/office/drawing/2014/main" xmlns="" id="{3B7428FC-C061-4730-9EA5-A52A00413991}"/>
+                <a16:creationId xmlns="" xmlns:a16="http://schemas.microsoft.com/office/drawing/2014/main" id="{3B7428FC-C061-4730-9EA5-A52A00413991}"/>
               </a:ext>
             </a:extLst>
           </p:cNvPr>
@@ -3312,7 +3312,7 @@
           <p:cNvPr id="8" name="Content Placeholder 2">
             <a:extLst>
               <a:ext uri="{FF2B5EF4-FFF2-40B4-BE49-F238E27FC236}">
-                <a16:creationId xmlns:a16="http://schemas.microsoft.com/office/drawing/2014/main" xmlns="" id="{B09D4C03-E8B1-644E-949B-F7AF91181833}"/>
+                <a16:creationId xmlns="" xmlns:a16="http://schemas.microsoft.com/office/drawing/2014/main" id="{B09D4C03-E8B1-644E-949B-F7AF91181833}"/>
               </a:ext>
             </a:extLst>
           </p:cNvPr>
@@ -3385,7 +3385,7 @@
           <p:cNvPr id="5" name="Title 1">
             <a:extLst>
               <a:ext uri="{FF2B5EF4-FFF2-40B4-BE49-F238E27FC236}">
-                <a16:creationId xmlns:a16="http://schemas.microsoft.com/office/drawing/2014/main" xmlns="" id="{02EDA17D-AAE6-954F-93C6-90B8D7B80BD1}"/>
+                <a16:creationId xmlns="" xmlns:a16="http://schemas.microsoft.com/office/drawing/2014/main" id="{02EDA17D-AAE6-954F-93C6-90B8D7B80BD1}"/>
               </a:ext>
             </a:extLst>
           </p:cNvPr>
@@ -3465,7 +3465,7 @@
           <p:cNvPr id="2" name="Title 1">
             <a:extLst>
               <a:ext uri="{FF2B5EF4-FFF2-40B4-BE49-F238E27FC236}">
-                <a16:creationId xmlns:a16="http://schemas.microsoft.com/office/drawing/2014/main" xmlns="" id="{A1AAFE49-0143-472F-897B-A7DAB87AB4E4}"/>
+                <a16:creationId xmlns="" xmlns:a16="http://schemas.microsoft.com/office/drawing/2014/main" id="{A1AAFE49-0143-472F-897B-A7DAB87AB4E4}"/>
               </a:ext>
             </a:extLst>
           </p:cNvPr>
@@ -3494,7 +3494,7 @@
           <p:cNvPr id="4" name="Content Placeholder 3">
             <a:extLst>
               <a:ext uri="{FF2B5EF4-FFF2-40B4-BE49-F238E27FC236}">
-                <a16:creationId xmlns:a16="http://schemas.microsoft.com/office/drawing/2014/main" xmlns="" id="{46F0C709-1F3D-4B13-A290-4041A33FB10E}"/>
+                <a16:creationId xmlns="" xmlns:a16="http://schemas.microsoft.com/office/drawing/2014/main" id="{46F0C709-1F3D-4B13-A290-4041A33FB10E}"/>
               </a:ext>
             </a:extLst>
           </p:cNvPr>
@@ -3555,7 +3555,7 @@
           <p:cNvPr id="6" name="Footer Placeholder 5">
             <a:extLst>
               <a:ext uri="{FF2B5EF4-FFF2-40B4-BE49-F238E27FC236}">
-                <a16:creationId xmlns:a16="http://schemas.microsoft.com/office/drawing/2014/main" xmlns="" id="{60A8C9C5-E913-47B9-82DE-196768E6D657}"/>
+                <a16:creationId xmlns="" xmlns:a16="http://schemas.microsoft.com/office/drawing/2014/main" id="{60A8C9C5-E913-47B9-82DE-196768E6D657}"/>
               </a:ext>
             </a:extLst>
           </p:cNvPr>
@@ -3583,7 +3583,7 @@
           <p:cNvPr id="7" name="Slide Number Placeholder 6">
             <a:extLst>
               <a:ext uri="{FF2B5EF4-FFF2-40B4-BE49-F238E27FC236}">
-                <a16:creationId xmlns:a16="http://schemas.microsoft.com/office/drawing/2014/main" xmlns="" id="{E1558F66-ECA3-4B00-A383-8D2B86217C93}"/>
+                <a16:creationId xmlns="" xmlns:a16="http://schemas.microsoft.com/office/drawing/2014/main" id="{E1558F66-ECA3-4B00-A383-8D2B86217C93}"/>
               </a:ext>
             </a:extLst>
           </p:cNvPr>
@@ -3613,7 +3613,7 @@
           <p:cNvPr id="10" name="Picture Placeholder 9">
             <a:extLst>
               <a:ext uri="{FF2B5EF4-FFF2-40B4-BE49-F238E27FC236}">
-                <a16:creationId xmlns:a16="http://schemas.microsoft.com/office/drawing/2014/main" xmlns="" id="{874043F1-6F14-49BD-83CA-12B559ABC101}"/>
+                <a16:creationId xmlns="" xmlns:a16="http://schemas.microsoft.com/office/drawing/2014/main" id="{874043F1-6F14-49BD-83CA-12B559ABC101}"/>
               </a:ext>
             </a:extLst>
           </p:cNvPr>
@@ -3643,7 +3643,7 @@
           <p:cNvPr id="11" name="Rectangle 10">
             <a:extLst>
               <a:ext uri="{FF2B5EF4-FFF2-40B4-BE49-F238E27FC236}">
-                <a16:creationId xmlns:a16="http://schemas.microsoft.com/office/drawing/2014/main" xmlns="" id="{4B51C537-0174-43E5-8B81-C80AF1D06831}"/>
+                <a16:creationId xmlns="" xmlns:a16="http://schemas.microsoft.com/office/drawing/2014/main" id="{4B51C537-0174-43E5-8B81-C80AF1D06831}"/>
               </a:ext>
             </a:extLst>
           </p:cNvPr>
@@ -3733,7 +3733,7 @@
           <p:cNvPr id="2" name="Title 1">
             <a:extLst>
               <a:ext uri="{FF2B5EF4-FFF2-40B4-BE49-F238E27FC236}">
-                <a16:creationId xmlns:a16="http://schemas.microsoft.com/office/drawing/2014/main" xmlns="" id="{A1AAFE49-0143-472F-897B-A7DAB87AB4E4}"/>
+                <a16:creationId xmlns="" xmlns:a16="http://schemas.microsoft.com/office/drawing/2014/main" id="{A1AAFE49-0143-472F-897B-A7DAB87AB4E4}"/>
               </a:ext>
             </a:extLst>
           </p:cNvPr>
@@ -3762,7 +3762,7 @@
           <p:cNvPr id="6" name="Footer Placeholder 5">
             <a:extLst>
               <a:ext uri="{FF2B5EF4-FFF2-40B4-BE49-F238E27FC236}">
-                <a16:creationId xmlns:a16="http://schemas.microsoft.com/office/drawing/2014/main" xmlns="" id="{60A8C9C5-E913-47B9-82DE-196768E6D657}"/>
+                <a16:creationId xmlns="" xmlns:a16="http://schemas.microsoft.com/office/drawing/2014/main" id="{60A8C9C5-E913-47B9-82DE-196768E6D657}"/>
               </a:ext>
             </a:extLst>
           </p:cNvPr>
@@ -3790,7 +3790,7 @@
           <p:cNvPr id="7" name="Slide Number Placeholder 6">
             <a:extLst>
               <a:ext uri="{FF2B5EF4-FFF2-40B4-BE49-F238E27FC236}">
-                <a16:creationId xmlns:a16="http://schemas.microsoft.com/office/drawing/2014/main" xmlns="" id="{E1558F66-ECA3-4B00-A383-8D2B86217C93}"/>
+                <a16:creationId xmlns="" xmlns:a16="http://schemas.microsoft.com/office/drawing/2014/main" id="{E1558F66-ECA3-4B00-A383-8D2B86217C93}"/>
               </a:ext>
             </a:extLst>
           </p:cNvPr>
@@ -3820,7 +3820,7 @@
           <p:cNvPr id="8" name="Rectangle 7">
             <a:extLst>
               <a:ext uri="{FF2B5EF4-FFF2-40B4-BE49-F238E27FC236}">
-                <a16:creationId xmlns:a16="http://schemas.microsoft.com/office/drawing/2014/main" xmlns="" id="{039FCF96-B7D6-4CCD-A4AE-46A67249D3BD}"/>
+                <a16:creationId xmlns="" xmlns:a16="http://schemas.microsoft.com/office/drawing/2014/main" id="{039FCF96-B7D6-4CCD-A4AE-46A67249D3BD}"/>
               </a:ext>
             </a:extLst>
           </p:cNvPr>
@@ -3872,7 +3872,7 @@
           <p:cNvPr id="10" name="Content Placeholder 9">
             <a:extLst>
               <a:ext uri="{FF2B5EF4-FFF2-40B4-BE49-F238E27FC236}">
-                <a16:creationId xmlns:a16="http://schemas.microsoft.com/office/drawing/2014/main" xmlns="" id="{741F3B7A-B2BF-40FC-8EB2-F1C37D316488}"/>
+                <a16:creationId xmlns="" xmlns:a16="http://schemas.microsoft.com/office/drawing/2014/main" id="{741F3B7A-B2BF-40FC-8EB2-F1C37D316488}"/>
               </a:ext>
             </a:extLst>
           </p:cNvPr>
@@ -3933,7 +3933,7 @@
           <p:cNvPr id="9" name="Content Placeholder 9">
             <a:extLst>
               <a:ext uri="{FF2B5EF4-FFF2-40B4-BE49-F238E27FC236}">
-                <a16:creationId xmlns:a16="http://schemas.microsoft.com/office/drawing/2014/main" xmlns="" id="{75B7A667-B99F-7A41-AAC3-ED24B9B1D92E}"/>
+                <a16:creationId xmlns="" xmlns:a16="http://schemas.microsoft.com/office/drawing/2014/main" id="{75B7A667-B99F-7A41-AAC3-ED24B9B1D92E}"/>
               </a:ext>
             </a:extLst>
           </p:cNvPr>
@@ -3994,7 +3994,7 @@
           <p:cNvPr id="11" name="Content Placeholder 9">
             <a:extLst>
               <a:ext uri="{FF2B5EF4-FFF2-40B4-BE49-F238E27FC236}">
-                <a16:creationId xmlns:a16="http://schemas.microsoft.com/office/drawing/2014/main" xmlns="" id="{93C1FF47-695D-B348-AF37-1ADF5736FA9E}"/>
+                <a16:creationId xmlns="" xmlns:a16="http://schemas.microsoft.com/office/drawing/2014/main" id="{93C1FF47-695D-B348-AF37-1ADF5736FA9E}"/>
               </a:ext>
             </a:extLst>
           </p:cNvPr>
@@ -4090,7 +4090,7 @@
           <p:cNvPr id="2" name="Title Placeholder 1">
             <a:extLst>
               <a:ext uri="{FF2B5EF4-FFF2-40B4-BE49-F238E27FC236}">
-                <a16:creationId xmlns:a16="http://schemas.microsoft.com/office/drawing/2014/main" xmlns="" id="{DB1A62CF-E2B4-496D-829D-DCE37260977D}"/>
+                <a16:creationId xmlns="" xmlns:a16="http://schemas.microsoft.com/office/drawing/2014/main" id="{DB1A62CF-E2B4-496D-829D-DCE37260977D}"/>
               </a:ext>
             </a:extLst>
           </p:cNvPr>
@@ -4129,7 +4129,7 @@
           <p:cNvPr id="3" name="Text Placeholder 2">
             <a:extLst>
               <a:ext uri="{FF2B5EF4-FFF2-40B4-BE49-F238E27FC236}">
-                <a16:creationId xmlns:a16="http://schemas.microsoft.com/office/drawing/2014/main" xmlns="" id="{DFD84EF4-0E07-4BF3-A4AB-3E8632AA79AD}"/>
+                <a16:creationId xmlns="" xmlns:a16="http://schemas.microsoft.com/office/drawing/2014/main" id="{DFD84EF4-0E07-4BF3-A4AB-3E8632AA79AD}"/>
               </a:ext>
             </a:extLst>
           </p:cNvPr>
@@ -4197,7 +4197,7 @@
           <p:cNvPr id="5" name="Footer Placeholder 4">
             <a:extLst>
               <a:ext uri="{FF2B5EF4-FFF2-40B4-BE49-F238E27FC236}">
-                <a16:creationId xmlns:a16="http://schemas.microsoft.com/office/drawing/2014/main" xmlns="" id="{3B527A5D-B761-4C2F-97E6-5D8254424B8B}"/>
+                <a16:creationId xmlns="" xmlns:a16="http://schemas.microsoft.com/office/drawing/2014/main" id="{3B527A5D-B761-4C2F-97E6-5D8254424B8B}"/>
               </a:ext>
             </a:extLst>
           </p:cNvPr>
@@ -4245,7 +4245,7 @@
           <p:cNvPr id="6" name="Slide Number Placeholder 5">
             <a:extLst>
               <a:ext uri="{FF2B5EF4-FFF2-40B4-BE49-F238E27FC236}">
-                <a16:creationId xmlns:a16="http://schemas.microsoft.com/office/drawing/2014/main" xmlns="" id="{9CD661B1-4E4B-4F85-ACA3-C34023D70282}"/>
+                <a16:creationId xmlns="" xmlns:a16="http://schemas.microsoft.com/office/drawing/2014/main" id="{9CD661B1-4E4B-4F85-ACA3-C34023D70282}"/>
               </a:ext>
             </a:extLst>
           </p:cNvPr>
@@ -4674,7 +4674,7 @@
           <p:cNvPr id="2" name="Subtitle 1">
             <a:extLst>
               <a:ext uri="{FF2B5EF4-FFF2-40B4-BE49-F238E27FC236}">
-                <a16:creationId xmlns:a16="http://schemas.microsoft.com/office/drawing/2014/main" xmlns="" id="{6A29D8FC-E32A-5566-0930-02B99F5763A6}"/>
+                <a16:creationId xmlns="" xmlns:a16="http://schemas.microsoft.com/office/drawing/2014/main" id="{6A29D8FC-E32A-5566-0930-02B99F5763A6}"/>
               </a:ext>
             </a:extLst>
           </p:cNvPr>
@@ -4707,7 +4707,7 @@
           <p:cNvPr id="4" name="Slide Number Placeholder 3">
             <a:extLst>
               <a:ext uri="{FF2B5EF4-FFF2-40B4-BE49-F238E27FC236}">
-                <a16:creationId xmlns:a16="http://schemas.microsoft.com/office/drawing/2014/main" xmlns="" id="{E143B824-C7FA-8427-0A8B-E8B5D7787B83}"/>
+                <a16:creationId xmlns="" xmlns:a16="http://schemas.microsoft.com/office/drawing/2014/main" id="{E143B824-C7FA-8427-0A8B-E8B5D7787B83}"/>
               </a:ext>
             </a:extLst>
           </p:cNvPr>
@@ -4737,7 +4737,7 @@
           <p:cNvPr id="6" name="TextBox 5">
             <a:extLst>
               <a:ext uri="{FF2B5EF4-FFF2-40B4-BE49-F238E27FC236}">
-                <a16:creationId xmlns:a16="http://schemas.microsoft.com/office/drawing/2014/main" xmlns="" id="{6DD9461E-8553-F8C3-E23F-FB71330E931F}"/>
+                <a16:creationId xmlns="" xmlns:a16="http://schemas.microsoft.com/office/drawing/2014/main" id="{6DD9461E-8553-F8C3-E23F-FB71330E931F}"/>
               </a:ext>
             </a:extLst>
           </p:cNvPr>
@@ -4879,7 +4879,7 @@
           <p:cNvPr id="2" name="Title 1">
             <a:extLst>
               <a:ext uri="{FF2B5EF4-FFF2-40B4-BE49-F238E27FC236}">
-                <a16:creationId xmlns:a16="http://schemas.microsoft.com/office/drawing/2014/main" xmlns="" id="{3440AEE4-CC66-FE42-B0C3-2CC7AFD37D1C}"/>
+                <a16:creationId xmlns="" xmlns:a16="http://schemas.microsoft.com/office/drawing/2014/main" id="{3440AEE4-CC66-FE42-B0C3-2CC7AFD37D1C}"/>
               </a:ext>
             </a:extLst>
           </p:cNvPr>
@@ -4935,7 +4935,7 @@
           <p:cNvPr id="3" name="Subtitle 2">
             <a:extLst>
               <a:ext uri="{FF2B5EF4-FFF2-40B4-BE49-F238E27FC236}">
-                <a16:creationId xmlns:a16="http://schemas.microsoft.com/office/drawing/2014/main" xmlns="" id="{8275DA97-5166-7F4B-BC83-F50AC8BEDCD7}"/>
+                <a16:creationId xmlns="" xmlns:a16="http://schemas.microsoft.com/office/drawing/2014/main" id="{8275DA97-5166-7F4B-BC83-F50AC8BEDCD7}"/>
               </a:ext>
             </a:extLst>
           </p:cNvPr>
@@ -4976,7 +4976,7 @@
           <p:cNvPr id="4" name="Footer Placeholder 3">
             <a:extLst>
               <a:ext uri="{FF2B5EF4-FFF2-40B4-BE49-F238E27FC236}">
-                <a16:creationId xmlns:a16="http://schemas.microsoft.com/office/drawing/2014/main" xmlns="" id="{6E7F4D14-5620-EC41-A86C-6CC3CFD691B4}"/>
+                <a16:creationId xmlns="" xmlns:a16="http://schemas.microsoft.com/office/drawing/2014/main" id="{6E7F4D14-5620-EC41-A86C-6CC3CFD691B4}"/>
               </a:ext>
             </a:extLst>
           </p:cNvPr>
@@ -5140,7 +5140,7 @@
           <p:cNvPr id="3" name="Footer Placeholder 2">
             <a:extLst>
               <a:ext uri="{FF2B5EF4-FFF2-40B4-BE49-F238E27FC236}">
-                <a16:creationId xmlns:a16="http://schemas.microsoft.com/office/drawing/2014/main" xmlns="" id="{1E32129C-44C2-95DE-7FB4-8025AAB3EA1F}"/>
+                <a16:creationId xmlns="" xmlns:a16="http://schemas.microsoft.com/office/drawing/2014/main" id="{1E32129C-44C2-95DE-7FB4-8025AAB3EA1F}"/>
               </a:ext>
             </a:extLst>
           </p:cNvPr>
@@ -5168,7 +5168,7 @@
           <p:cNvPr id="4" name="Slide Number Placeholder 3">
             <a:extLst>
               <a:ext uri="{FF2B5EF4-FFF2-40B4-BE49-F238E27FC236}">
-                <a16:creationId xmlns:a16="http://schemas.microsoft.com/office/drawing/2014/main" xmlns="" id="{9143F542-9925-BCBE-2DA4-35A32A38D9AD}"/>
+                <a16:creationId xmlns="" xmlns:a16="http://schemas.microsoft.com/office/drawing/2014/main" id="{9143F542-9925-BCBE-2DA4-35A32A38D9AD}"/>
               </a:ext>
             </a:extLst>
           </p:cNvPr>
@@ -5198,7 +5198,7 @@
           <p:cNvPr id="5" name="Title 4">
             <a:extLst>
               <a:ext uri="{FF2B5EF4-FFF2-40B4-BE49-F238E27FC236}">
-                <a16:creationId xmlns:a16="http://schemas.microsoft.com/office/drawing/2014/main" xmlns="" id="{FEF2E89F-D251-B0A8-2377-FD314948D49C}"/>
+                <a16:creationId xmlns="" xmlns:a16="http://schemas.microsoft.com/office/drawing/2014/main" id="{FEF2E89F-D251-B0A8-2377-FD314948D49C}"/>
               </a:ext>
             </a:extLst>
           </p:cNvPr>
@@ -5299,7 +5299,7 @@
           <p:cNvPr id="2" name="Subtitle 1">
             <a:extLst>
               <a:ext uri="{FF2B5EF4-FFF2-40B4-BE49-F238E27FC236}">
-                <a16:creationId xmlns:a16="http://schemas.microsoft.com/office/drawing/2014/main" xmlns="" id="{7D9D8228-727F-1E46-B5AD-91D158B8255E}"/>
+                <a16:creationId xmlns="" xmlns:a16="http://schemas.microsoft.com/office/drawing/2014/main" id="{7D9D8228-727F-1E46-B5AD-91D158B8255E}"/>
               </a:ext>
             </a:extLst>
           </p:cNvPr>
@@ -5363,7 +5363,7 @@
           <p:cNvPr id="4" name="Slide Number Placeholder 3">
             <a:extLst>
               <a:ext uri="{FF2B5EF4-FFF2-40B4-BE49-F238E27FC236}">
-                <a16:creationId xmlns:a16="http://schemas.microsoft.com/office/drawing/2014/main" xmlns="" id="{CC9D9611-42EE-7840-81EE-DD6B1A99CD7B}"/>
+                <a16:creationId xmlns="" xmlns:a16="http://schemas.microsoft.com/office/drawing/2014/main" id="{CC9D9611-42EE-7840-81EE-DD6B1A99CD7B}"/>
               </a:ext>
             </a:extLst>
           </p:cNvPr>
@@ -5397,7 +5397,7 @@
           <p:cNvPr id="5" name="Title 4">
             <a:extLst>
               <a:ext uri="{FF2B5EF4-FFF2-40B4-BE49-F238E27FC236}">
-                <a16:creationId xmlns:a16="http://schemas.microsoft.com/office/drawing/2014/main" xmlns="" id="{B3FA3829-F12C-214D-8FBA-7E1A740F65CA}"/>
+                <a16:creationId xmlns="" xmlns:a16="http://schemas.microsoft.com/office/drawing/2014/main" id="{B3FA3829-F12C-214D-8FBA-7E1A740F65CA}"/>
               </a:ext>
             </a:extLst>
           </p:cNvPr>
@@ -5705,7 +5705,7 @@
           <p:cNvPr id="2" name="Subtitle 1">
             <a:extLst>
               <a:ext uri="{FF2B5EF4-FFF2-40B4-BE49-F238E27FC236}">
-                <a16:creationId xmlns:a16="http://schemas.microsoft.com/office/drawing/2014/main" xmlns="" id="{8E3CD731-5ACF-B002-247D-243F6E2149EC}"/>
+                <a16:creationId xmlns="" xmlns:a16="http://schemas.microsoft.com/office/drawing/2014/main" id="{8E3CD731-5ACF-B002-247D-243F6E2149EC}"/>
               </a:ext>
             </a:extLst>
           </p:cNvPr>
@@ -5752,7 +5752,7 @@
           <p:cNvPr id="3" name="Footer Placeholder 2">
             <a:extLst>
               <a:ext uri="{FF2B5EF4-FFF2-40B4-BE49-F238E27FC236}">
-                <a16:creationId xmlns:a16="http://schemas.microsoft.com/office/drawing/2014/main" xmlns="" id="{3C4D431B-7665-75B0-2D73-5BD588DCB766}"/>
+                <a16:creationId xmlns="" xmlns:a16="http://schemas.microsoft.com/office/drawing/2014/main" id="{3C4D431B-7665-75B0-2D73-5BD588DCB766}"/>
               </a:ext>
             </a:extLst>
           </p:cNvPr>
@@ -5785,7 +5785,7 @@
           <p:cNvPr id="4" name="Slide Number Placeholder 3">
             <a:extLst>
               <a:ext uri="{FF2B5EF4-FFF2-40B4-BE49-F238E27FC236}">
-                <a16:creationId xmlns:a16="http://schemas.microsoft.com/office/drawing/2014/main" xmlns="" id="{1625FA15-B17F-387B-E383-5505647ABB89}"/>
+                <a16:creationId xmlns="" xmlns:a16="http://schemas.microsoft.com/office/drawing/2014/main" id="{1625FA15-B17F-387B-E383-5505647ABB89}"/>
               </a:ext>
             </a:extLst>
           </p:cNvPr>
@@ -5819,7 +5819,7 @@
           <p:cNvPr id="5" name="Title 4">
             <a:extLst>
               <a:ext uri="{FF2B5EF4-FFF2-40B4-BE49-F238E27FC236}">
-                <a16:creationId xmlns:a16="http://schemas.microsoft.com/office/drawing/2014/main" xmlns="" id="{3440DA25-F620-152B-DE9E-776F7B74DFF0}"/>
+                <a16:creationId xmlns="" xmlns:a16="http://schemas.microsoft.com/office/drawing/2014/main" id="{3440DA25-F620-152B-DE9E-776F7B74DFF0}"/>
               </a:ext>
             </a:extLst>
           </p:cNvPr>
@@ -6089,7 +6089,7 @@
           <p:cNvPr id="2" name="Subtitle 1">
             <a:extLst>
               <a:ext uri="{FF2B5EF4-FFF2-40B4-BE49-F238E27FC236}">
-                <a16:creationId xmlns:a16="http://schemas.microsoft.com/office/drawing/2014/main" xmlns="" id="{6B64221B-D6D4-E382-A91A-99FF908D5475}"/>
+                <a16:creationId xmlns="" xmlns:a16="http://schemas.microsoft.com/office/drawing/2014/main" id="{6B64221B-D6D4-E382-A91A-99FF908D5475}"/>
               </a:ext>
             </a:extLst>
           </p:cNvPr>
@@ -6143,7 +6143,7 @@
           <p:cNvPr id="4" name="Slide Number Placeholder 3">
             <a:extLst>
               <a:ext uri="{FF2B5EF4-FFF2-40B4-BE49-F238E27FC236}">
-                <a16:creationId xmlns:a16="http://schemas.microsoft.com/office/drawing/2014/main" xmlns="" id="{FF7EDF94-2B89-A21D-BBC0-E455C2D9893B}"/>
+                <a16:creationId xmlns="" xmlns:a16="http://schemas.microsoft.com/office/drawing/2014/main" id="{FF7EDF94-2B89-A21D-BBC0-E455C2D9893B}"/>
               </a:ext>
             </a:extLst>
           </p:cNvPr>
@@ -6177,7 +6177,7 @@
           <p:cNvPr id="9" name="Title 8">
             <a:extLst>
               <a:ext uri="{FF2B5EF4-FFF2-40B4-BE49-F238E27FC236}">
-                <a16:creationId xmlns:a16="http://schemas.microsoft.com/office/drawing/2014/main" xmlns="" id="{D1A8E56B-DFF3-4B99-A410-52B14F2E39E7}"/>
+                <a16:creationId xmlns="" xmlns:a16="http://schemas.microsoft.com/office/drawing/2014/main" id="{D1A8E56B-DFF3-4B99-A410-52B14F2E39E7}"/>
               </a:ext>
             </a:extLst>
           </p:cNvPr>
@@ -6244,7 +6244,19 @@
               <a:rPr lang="en-US" sz="2000" b="0" spc="0" dirty="0">
                 <a:latin typeface="+mn-lt"/>
               </a:rPr>
-              <a:t>There is no significant difference in the mean age-standardized death rate from respiratory infections per 100,000 people between countries.</a:t>
+              <a:t>There is no </a:t>
+            </a:r>
+            <a:r>
+              <a:rPr lang="en-US" sz="2000" b="0" spc="0" dirty="0" smtClean="0">
+                <a:latin typeface="+mn-lt"/>
+              </a:rPr>
+              <a:t>difference </a:t>
+            </a:r>
+            <a:r>
+              <a:rPr lang="en-US" sz="2000" b="0" spc="0" dirty="0">
+                <a:latin typeface="+mn-lt"/>
+              </a:rPr>
+              <a:t>in the mean age-standardized death rate from respiratory infections per 100,000 people between countries.</a:t>
             </a:r>
             <a:r>
               <a:rPr lang="en-GB" sz="2000" b="0" spc="0" dirty="0">
@@ -6290,7 +6302,19 @@
               <a:rPr lang="en-US" sz="2000" b="0" spc="0" dirty="0">
                 <a:latin typeface="+mn-lt"/>
               </a:rPr>
-              <a:t>There is a significant difference in the mean age-standardized death rate from respiratory infections per 100,000 people between </a:t>
+              <a:t>There is a </a:t>
+            </a:r>
+            <a:r>
+              <a:rPr lang="en-US" sz="2000" b="0" spc="0" dirty="0" smtClean="0">
+                <a:latin typeface="+mn-lt"/>
+              </a:rPr>
+              <a:t>difference </a:t>
+            </a:r>
+            <a:r>
+              <a:rPr lang="en-US" sz="2000" b="0" spc="0" dirty="0">
+                <a:latin typeface="+mn-lt"/>
+              </a:rPr>
+              <a:t>in the mean age-standardized death rate from respiratory infections per 100,000 people between </a:t>
             </a:r>
             <a:r>
               <a:rPr lang="en-US" sz="2000" b="0" spc="0" dirty="0" smtClean="0">
@@ -7176,23 +7200,6 @@
 </file>
 
 <file path=customXml/item1.xml><?xml version="1.0" encoding="utf-8"?>
-<p:properties xmlns:p="http://schemas.microsoft.com/office/2006/metadata/properties" xmlns:xsi="http://www.w3.org/2001/XMLSchema-instance" xmlns:pc="http://schemas.microsoft.com/office/infopath/2007/PartnerControls">
-  <documentManagement>
-    <Information xmlns="4ad138b4-2b68-4b70-945d-07f8f18b1c9a" xsi:nil="true"/>
-  </documentManagement>
-</p:properties>
-</file>
-
-<file path=customXml/item2.xml><?xml version="1.0" encoding="utf-8"?>
-<?mso-contentType ?>
-<FormTemplates xmlns="http://schemas.microsoft.com/sharepoint/v3/contenttype/forms">
-  <Display>DocumentLibraryForm</Display>
-  <Edit>DocumentLibraryForm</Edit>
-  <New>DocumentLibraryForm</New>
-</FormTemplates>
-</file>
-
-<file path=customXml/item3.xml><?xml version="1.0" encoding="utf-8"?>
 <ct:contentTypeSchema xmlns:ct="http://schemas.microsoft.com/office/2006/metadata/contentType" xmlns:ma="http://schemas.microsoft.com/office/2006/metadata/properties/metaAttributes" ct:_="" ma:_="" ma:contentTypeName="Document" ma:contentTypeID="0x01010026DBA85F447B164191BB36C258697B67" ma:contentTypeVersion="14" ma:contentTypeDescription="Create a new document." ma:contentTypeScope="" ma:versionID="ea511d05ca7f895fe9556935b5c9af34">
   <xsd:schema xmlns:xsd="http://www.w3.org/2001/XMLSchema" xmlns:xs="http://www.w3.org/2001/XMLSchema" xmlns:p="http://schemas.microsoft.com/office/2006/metadata/properties" xmlns:ns2="4ad138b4-2b68-4b70-945d-07f8f18b1c9a" xmlns:ns3="3c474641-ec36-472f-b125-6b1b0910eaa4" targetNamespace="http://schemas.microsoft.com/office/2006/metadata/properties" ma:root="true" ma:fieldsID="662270106d7a7e100bcac2c5f8d29899" ns2:_="" ns3:_="">
     <xsd:import namespace="4ad138b4-2b68-4b70-945d-07f8f18b1c9a"/>
@@ -7417,32 +7424,24 @@
 </ct:contentTypeSchema>
 </file>
 
-<file path=customXml/itemProps1.xml><?xml version="1.0" encoding="utf-8"?>
-<ds:datastoreItem xmlns:ds="http://schemas.openxmlformats.org/officeDocument/2006/customXml" ds:itemID="{EDD1FC41-23C7-41B0-B5F9-BF4CD38AD2ED}">
-  <ds:schemaRefs>
-    <ds:schemaRef ds:uri="http://schemas.microsoft.com/office/infopath/2007/PartnerControls"/>
-    <ds:schemaRef ds:uri="3c474641-ec36-472f-b125-6b1b0910eaa4"/>
-    <ds:schemaRef ds:uri="http://purl.org/dc/terms/"/>
-    <ds:schemaRef ds:uri="http://schemas.microsoft.com/office/2006/documentManagement/types"/>
-    <ds:schemaRef ds:uri="http://www.w3.org/XML/1998/namespace"/>
-    <ds:schemaRef ds:uri="http://purl.org/dc/elements/1.1/"/>
-    <ds:schemaRef ds:uri="http://schemas.openxmlformats.org/package/2006/metadata/core-properties"/>
-    <ds:schemaRef ds:uri="4ad138b4-2b68-4b70-945d-07f8f18b1c9a"/>
-    <ds:schemaRef ds:uri="http://schemas.microsoft.com/office/2006/metadata/properties"/>
-    <ds:schemaRef ds:uri="http://purl.org/dc/dcmitype/"/>
-  </ds:schemaRefs>
-</ds:datastoreItem>
+<file path=customXml/item2.xml><?xml version="1.0" encoding="utf-8"?>
+<?mso-contentType ?>
+<FormTemplates xmlns="http://schemas.microsoft.com/sharepoint/v3/contenttype/forms">
+  <Display>DocumentLibraryForm</Display>
+  <Edit>DocumentLibraryForm</Edit>
+  <New>DocumentLibraryForm</New>
+</FormTemplates>
 </file>
 
-<file path=customXml/itemProps2.xml><?xml version="1.0" encoding="utf-8"?>
-<ds:datastoreItem xmlns:ds="http://schemas.openxmlformats.org/officeDocument/2006/customXml" ds:itemID="{91C521DD-2673-4EE6-BB9B-DC5C3320FFBB}">
-  <ds:schemaRefs>
-    <ds:schemaRef ds:uri="http://schemas.microsoft.com/sharepoint/v3/contenttype/forms"/>
-  </ds:schemaRefs>
-</ds:datastoreItem>
+<file path=customXml/item3.xml><?xml version="1.0" encoding="utf-8"?>
+<p:properties xmlns:p="http://schemas.microsoft.com/office/2006/metadata/properties" xmlns:xsi="http://www.w3.org/2001/XMLSchema-instance" xmlns:pc="http://schemas.microsoft.com/office/infopath/2007/PartnerControls">
+  <documentManagement>
+    <Information xmlns="4ad138b4-2b68-4b70-945d-07f8f18b1c9a" xsi:nil="true"/>
+  </documentManagement>
+</p:properties>
 </file>
 
-<file path=customXml/itemProps3.xml><?xml version="1.0" encoding="utf-8"?>
+<file path=customXml/itemProps1.xml><?xml version="1.0" encoding="utf-8"?>
 <ds:datastoreItem xmlns:ds="http://schemas.openxmlformats.org/officeDocument/2006/customXml" ds:itemID="{421B8C57-903D-4D0E-8336-7B512F760CD1}">
   <ds:schemaRefs>
     <ds:schemaRef ds:uri="http://schemas.microsoft.com/office/2006/metadata/contentType"/>
@@ -7459,4 +7458,29 @@
     <ds:schemaRef ds:uri="http://schemas.microsoft.com/internal/obd"/>
   </ds:schemaRefs>
 </ds:datastoreItem>
+</file>
+
+<file path=customXml/itemProps2.xml><?xml version="1.0" encoding="utf-8"?>
+<ds:datastoreItem xmlns:ds="http://schemas.openxmlformats.org/officeDocument/2006/customXml" ds:itemID="{91C521DD-2673-4EE6-BB9B-DC5C3320FFBB}">
+  <ds:schemaRefs>
+    <ds:schemaRef ds:uri="http://schemas.microsoft.com/sharepoint/v3/contenttype/forms"/>
+  </ds:schemaRefs>
+</ds:datastoreItem>
+</file>
+
+<file path=customXml/itemProps3.xml><?xml version="1.0" encoding="utf-8"?>
+<ds:datastoreItem xmlns:ds="http://schemas.openxmlformats.org/officeDocument/2006/customXml" ds:itemID="{EDD1FC41-23C7-41B0-B5F9-BF4CD38AD2ED}">
+  <ds:schemaRefs>
+    <ds:schemaRef ds:uri="http://schemas.microsoft.com/office/infopath/2007/PartnerControls"/>
+    <ds:schemaRef ds:uri="3c474641-ec36-472f-b125-6b1b0910eaa4"/>
+    <ds:schemaRef ds:uri="http://purl.org/dc/terms/"/>
+    <ds:schemaRef ds:uri="http://schemas.microsoft.com/office/2006/documentManagement/types"/>
+    <ds:schemaRef ds:uri="http://www.w3.org/XML/1998/namespace"/>
+    <ds:schemaRef ds:uri="http://purl.org/dc/elements/1.1/"/>
+    <ds:schemaRef ds:uri="http://schemas.openxmlformats.org/package/2006/metadata/core-properties"/>
+    <ds:schemaRef ds:uri="4ad138b4-2b68-4b70-945d-07f8f18b1c9a"/>
+    <ds:schemaRef ds:uri="http://schemas.microsoft.com/office/2006/metadata/properties"/>
+    <ds:schemaRef ds:uri="http://purl.org/dc/dcmitype/"/>
+  </ds:schemaRefs>
+</ds:datastoreItem>
 </file>
</xml_diff>

<commit_message>
updated presentation with RQ
</commit_message>
<xml_diff>
--- a/reseach_question_presentation_template (1).pptx
+++ b/reseach_question_presentation_template (1).pptx
@@ -187,7 +187,7 @@
           <p:cNvPr id="2" name="Header Placeholder 1">
             <a:extLst>
               <a:ext uri="{FF2B5EF4-FFF2-40B4-BE49-F238E27FC236}">
-                <a16:creationId xmlns="" xmlns:a16="http://schemas.microsoft.com/office/drawing/2014/main" id="{898966F2-21A1-4B2B-ADA6-AD0BB447B7CB}"/>
+                <a16:creationId xmlns:a16="http://schemas.microsoft.com/office/drawing/2014/main" xmlns="" id="{898966F2-21A1-4B2B-ADA6-AD0BB447B7CB}"/>
               </a:ext>
             </a:extLst>
           </p:cNvPr>
@@ -224,7 +224,7 @@
           <p:cNvPr id="3" name="Date Placeholder 2">
             <a:extLst>
               <a:ext uri="{FF2B5EF4-FFF2-40B4-BE49-F238E27FC236}">
-                <a16:creationId xmlns="" xmlns:a16="http://schemas.microsoft.com/office/drawing/2014/main" id="{751468BB-CDF2-4507-B4EF-7B369D307A4D}"/>
+                <a16:creationId xmlns:a16="http://schemas.microsoft.com/office/drawing/2014/main" xmlns="" id="{751468BB-CDF2-4507-B4EF-7B369D307A4D}"/>
               </a:ext>
             </a:extLst>
           </p:cNvPr>
@@ -255,7 +255,7 @@
             <a:fld id="{93FAAC3A-BD1F-4A00-9099-74B95789FE00}" type="datetimeFigureOut">
               <a:rPr lang="en-GB" smtClean="0"/>
               <a:pPr/>
-              <a:t>17/11/2024</a:t>
+              <a:t>04/12/2024</a:t>
             </a:fld>
             <a:endParaRPr lang="en-GB"/>
           </a:p>
@@ -266,7 +266,7 @@
           <p:cNvPr id="4" name="Footer Placeholder 3">
             <a:extLst>
               <a:ext uri="{FF2B5EF4-FFF2-40B4-BE49-F238E27FC236}">
-                <a16:creationId xmlns="" xmlns:a16="http://schemas.microsoft.com/office/drawing/2014/main" id="{904BCF7D-6037-48D3-84E5-56B8B0552143}"/>
+                <a16:creationId xmlns:a16="http://schemas.microsoft.com/office/drawing/2014/main" xmlns="" id="{904BCF7D-6037-48D3-84E5-56B8B0552143}"/>
               </a:ext>
             </a:extLst>
           </p:cNvPr>
@@ -303,7 +303,7 @@
           <p:cNvPr id="5" name="Slide Number Placeholder 4">
             <a:extLst>
               <a:ext uri="{FF2B5EF4-FFF2-40B4-BE49-F238E27FC236}">
-                <a16:creationId xmlns="" xmlns:a16="http://schemas.microsoft.com/office/drawing/2014/main" id="{D619E732-656C-4BB5-ACCB-1568C5C66DD7}"/>
+                <a16:creationId xmlns:a16="http://schemas.microsoft.com/office/drawing/2014/main" xmlns="" id="{D619E732-656C-4BB5-ACCB-1568C5C66DD7}"/>
               </a:ext>
             </a:extLst>
           </p:cNvPr>
@@ -434,7 +434,7 @@
             <a:fld id="{8E359C8A-39F6-4045-9163-4042C4C26B15}" type="datetimeFigureOut">
               <a:rPr lang="en-GB" smtClean="0"/>
               <a:pPr/>
-              <a:t>17/11/2024</a:t>
+              <a:t>04/12/2024</a:t>
             </a:fld>
             <a:endParaRPr lang="en-GB"/>
           </a:p>
@@ -929,7 +929,7 @@
           <p:cNvPr id="4" name="Picture 3" descr="University of Hertfordshire logo">
             <a:extLst>
               <a:ext uri="{FF2B5EF4-FFF2-40B4-BE49-F238E27FC236}">
-                <a16:creationId xmlns="" xmlns:a16="http://schemas.microsoft.com/office/drawing/2014/main" id="{16E4BB13-0D32-AA4A-BF91-2B76A7C18242}"/>
+                <a16:creationId xmlns:a16="http://schemas.microsoft.com/office/drawing/2014/main" xmlns="" id="{16E4BB13-0D32-AA4A-BF91-2B76A7C18242}"/>
               </a:ext>
             </a:extLst>
           </p:cNvPr>
@@ -1003,7 +1003,7 @@
           <p:cNvPr id="3" name="Picture Placeholder 2">
             <a:extLst>
               <a:ext uri="{FF2B5EF4-FFF2-40B4-BE49-F238E27FC236}">
-                <a16:creationId xmlns="" xmlns:a16="http://schemas.microsoft.com/office/drawing/2014/main" id="{A307C322-846C-9045-AD91-A93C82FC5AAF}"/>
+                <a16:creationId xmlns:a16="http://schemas.microsoft.com/office/drawing/2014/main" xmlns="" id="{A307C322-846C-9045-AD91-A93C82FC5AAF}"/>
               </a:ext>
             </a:extLst>
           </p:cNvPr>
@@ -1082,7 +1082,7 @@
           <p:cNvPr id="9" name="Media Placeholder 8">
             <a:extLst>
               <a:ext uri="{FF2B5EF4-FFF2-40B4-BE49-F238E27FC236}">
-                <a16:creationId xmlns="" xmlns:a16="http://schemas.microsoft.com/office/drawing/2014/main" id="{9ABCF9A5-761F-434B-BBB5-D788CB1E79D8}"/>
+                <a16:creationId xmlns:a16="http://schemas.microsoft.com/office/drawing/2014/main" xmlns="" id="{9ABCF9A5-761F-434B-BBB5-D788CB1E79D8}"/>
               </a:ext>
             </a:extLst>
           </p:cNvPr>
@@ -1153,7 +1153,7 @@
           <p:cNvPr id="5" name="Footer Placeholder 4">
             <a:extLst>
               <a:ext uri="{FF2B5EF4-FFF2-40B4-BE49-F238E27FC236}">
-                <a16:creationId xmlns="" xmlns:a16="http://schemas.microsoft.com/office/drawing/2014/main" id="{962B6D5D-0892-4B4E-86D9-894852B1242C}"/>
+                <a16:creationId xmlns:a16="http://schemas.microsoft.com/office/drawing/2014/main" xmlns="" id="{962B6D5D-0892-4B4E-86D9-894852B1242C}"/>
               </a:ext>
             </a:extLst>
           </p:cNvPr>
@@ -1181,7 +1181,7 @@
           <p:cNvPr id="6" name="Slide Number Placeholder 5">
             <a:extLst>
               <a:ext uri="{FF2B5EF4-FFF2-40B4-BE49-F238E27FC236}">
-                <a16:creationId xmlns="" xmlns:a16="http://schemas.microsoft.com/office/drawing/2014/main" id="{3B7428FC-C061-4730-9EA5-A52A00413991}"/>
+                <a16:creationId xmlns:a16="http://schemas.microsoft.com/office/drawing/2014/main" xmlns="" id="{3B7428FC-C061-4730-9EA5-A52A00413991}"/>
               </a:ext>
             </a:extLst>
           </p:cNvPr>
@@ -1211,7 +1211,7 @@
           <p:cNvPr id="7" name="Rectangle 6">
             <a:extLst>
               <a:ext uri="{FF2B5EF4-FFF2-40B4-BE49-F238E27FC236}">
-                <a16:creationId xmlns="" xmlns:a16="http://schemas.microsoft.com/office/drawing/2014/main" id="{850AA271-B0BA-42CD-A544-17AAB1FA2EEA}"/>
+                <a16:creationId xmlns:a16="http://schemas.microsoft.com/office/drawing/2014/main" xmlns="" id="{850AA271-B0BA-42CD-A544-17AAB1FA2EEA}"/>
               </a:ext>
             </a:extLst>
           </p:cNvPr>
@@ -1263,7 +1263,7 @@
           <p:cNvPr id="16" name="Content Placeholder 2">
             <a:extLst>
               <a:ext uri="{FF2B5EF4-FFF2-40B4-BE49-F238E27FC236}">
-                <a16:creationId xmlns="" xmlns:a16="http://schemas.microsoft.com/office/drawing/2014/main" id="{699880E3-4DE3-A642-9738-DF49DDCC9AC5}"/>
+                <a16:creationId xmlns:a16="http://schemas.microsoft.com/office/drawing/2014/main" xmlns="" id="{699880E3-4DE3-A642-9738-DF49DDCC9AC5}"/>
               </a:ext>
             </a:extLst>
           </p:cNvPr>
@@ -1320,7 +1320,7 @@
           <p:cNvPr id="17" name="Content Placeholder 2">
             <a:extLst>
               <a:ext uri="{FF2B5EF4-FFF2-40B4-BE49-F238E27FC236}">
-                <a16:creationId xmlns="" xmlns:a16="http://schemas.microsoft.com/office/drawing/2014/main" id="{CF37D495-D835-8E4B-A177-5E12F893DDCA}"/>
+                <a16:creationId xmlns:a16="http://schemas.microsoft.com/office/drawing/2014/main" xmlns="" id="{CF37D495-D835-8E4B-A177-5E12F893DDCA}"/>
               </a:ext>
             </a:extLst>
           </p:cNvPr>
@@ -1412,7 +1412,7 @@
           <p:cNvPr id="18" name="Content Placeholder 2">
             <a:extLst>
               <a:ext uri="{FF2B5EF4-FFF2-40B4-BE49-F238E27FC236}">
-                <a16:creationId xmlns="" xmlns:a16="http://schemas.microsoft.com/office/drawing/2014/main" id="{A6804C7E-983C-9246-90C0-AF8A0CE2CA84}"/>
+                <a16:creationId xmlns:a16="http://schemas.microsoft.com/office/drawing/2014/main" xmlns="" id="{A6804C7E-983C-9246-90C0-AF8A0CE2CA84}"/>
               </a:ext>
             </a:extLst>
           </p:cNvPr>
@@ -1503,7 +1503,7 @@
           <p:cNvPr id="8" name="Picture Placeholder 7">
             <a:extLst>
               <a:ext uri="{FF2B5EF4-FFF2-40B4-BE49-F238E27FC236}">
-                <a16:creationId xmlns="" xmlns:a16="http://schemas.microsoft.com/office/drawing/2014/main" id="{84410427-8F1D-7541-9C05-AFDD3531678D}"/>
+                <a16:creationId xmlns:a16="http://schemas.microsoft.com/office/drawing/2014/main" xmlns="" id="{84410427-8F1D-7541-9C05-AFDD3531678D}"/>
               </a:ext>
             </a:extLst>
           </p:cNvPr>
@@ -1533,7 +1533,7 @@
           <p:cNvPr id="20" name="Picture Placeholder 7">
             <a:extLst>
               <a:ext uri="{FF2B5EF4-FFF2-40B4-BE49-F238E27FC236}">
-                <a16:creationId xmlns="" xmlns:a16="http://schemas.microsoft.com/office/drawing/2014/main" id="{8B7D5964-7A97-5742-8717-CCB747F84A08}"/>
+                <a16:creationId xmlns:a16="http://schemas.microsoft.com/office/drawing/2014/main" xmlns="" id="{8B7D5964-7A97-5742-8717-CCB747F84A08}"/>
               </a:ext>
             </a:extLst>
           </p:cNvPr>
@@ -1563,7 +1563,7 @@
           <p:cNvPr id="21" name="Picture Placeholder 7">
             <a:extLst>
               <a:ext uri="{FF2B5EF4-FFF2-40B4-BE49-F238E27FC236}">
-                <a16:creationId xmlns="" xmlns:a16="http://schemas.microsoft.com/office/drawing/2014/main" id="{344933FE-A401-A841-9AC3-B75285AA32D2}"/>
+                <a16:creationId xmlns:a16="http://schemas.microsoft.com/office/drawing/2014/main" xmlns="" id="{344933FE-A401-A841-9AC3-B75285AA32D2}"/>
               </a:ext>
             </a:extLst>
           </p:cNvPr>
@@ -1631,7 +1631,7 @@
           <p:cNvPr id="7" name="Picture 6">
             <a:extLst>
               <a:ext uri="{FF2B5EF4-FFF2-40B4-BE49-F238E27FC236}">
-                <a16:creationId xmlns="" xmlns:a16="http://schemas.microsoft.com/office/drawing/2014/main" id="{EE2CE188-32E7-4242-9E44-E8055FC030CC}"/>
+                <a16:creationId xmlns:a16="http://schemas.microsoft.com/office/drawing/2014/main" xmlns="" id="{EE2CE188-32E7-4242-9E44-E8055FC030CC}"/>
               </a:ext>
             </a:extLst>
           </p:cNvPr>
@@ -1666,7 +1666,7 @@
           <p:cNvPr id="2" name="Title 1">
             <a:extLst>
               <a:ext uri="{FF2B5EF4-FFF2-40B4-BE49-F238E27FC236}">
-                <a16:creationId xmlns="" xmlns:a16="http://schemas.microsoft.com/office/drawing/2014/main" id="{7381B53D-9933-445F-9B68-E730EB38A5A9}"/>
+                <a16:creationId xmlns:a16="http://schemas.microsoft.com/office/drawing/2014/main" xmlns="" id="{7381B53D-9933-445F-9B68-E730EB38A5A9}"/>
               </a:ext>
             </a:extLst>
           </p:cNvPr>
@@ -1718,7 +1718,7 @@
           <p:cNvPr id="5" name="Footer Placeholder 4">
             <a:extLst>
               <a:ext uri="{FF2B5EF4-FFF2-40B4-BE49-F238E27FC236}">
-                <a16:creationId xmlns="" xmlns:a16="http://schemas.microsoft.com/office/drawing/2014/main" id="{CA2BE80A-BFEC-E24A-B510-73A571F1F04F}"/>
+                <a16:creationId xmlns:a16="http://schemas.microsoft.com/office/drawing/2014/main" xmlns="" id="{CA2BE80A-BFEC-E24A-B510-73A571F1F04F}"/>
               </a:ext>
             </a:extLst>
           </p:cNvPr>
@@ -1766,7 +1766,7 @@
           <p:cNvPr id="6" name="Slide Number Placeholder 5">
             <a:extLst>
               <a:ext uri="{FF2B5EF4-FFF2-40B4-BE49-F238E27FC236}">
-                <a16:creationId xmlns="" xmlns:a16="http://schemas.microsoft.com/office/drawing/2014/main" id="{8E5B25B4-144A-5B4A-8EAD-2022412DF2F1}"/>
+                <a16:creationId xmlns:a16="http://schemas.microsoft.com/office/drawing/2014/main" xmlns="" id="{8E5B25B4-144A-5B4A-8EAD-2022412DF2F1}"/>
               </a:ext>
             </a:extLst>
           </p:cNvPr>
@@ -1849,7 +1849,7 @@
           <p:cNvPr id="2" name="Title 1">
             <a:extLst>
               <a:ext uri="{FF2B5EF4-FFF2-40B4-BE49-F238E27FC236}">
-                <a16:creationId xmlns="" xmlns:a16="http://schemas.microsoft.com/office/drawing/2014/main" id="{7381B53D-9933-445F-9B68-E730EB38A5A9}"/>
+                <a16:creationId xmlns:a16="http://schemas.microsoft.com/office/drawing/2014/main" xmlns="" id="{7381B53D-9933-445F-9B68-E730EB38A5A9}"/>
               </a:ext>
             </a:extLst>
           </p:cNvPr>
@@ -1896,7 +1896,7 @@
           <p:cNvPr id="3" name="Subtitle 2">
             <a:extLst>
               <a:ext uri="{FF2B5EF4-FFF2-40B4-BE49-F238E27FC236}">
-                <a16:creationId xmlns="" xmlns:a16="http://schemas.microsoft.com/office/drawing/2014/main" id="{E2C6B9F5-608F-4534-96F0-C3A5E1A638A6}"/>
+                <a16:creationId xmlns:a16="http://schemas.microsoft.com/office/drawing/2014/main" xmlns="" id="{E2C6B9F5-608F-4534-96F0-C3A5E1A638A6}"/>
               </a:ext>
             </a:extLst>
           </p:cNvPr>
@@ -1973,7 +1973,7 @@
           <p:cNvPr id="5" name="Footer Placeholder 4">
             <a:extLst>
               <a:ext uri="{FF2B5EF4-FFF2-40B4-BE49-F238E27FC236}">
-                <a16:creationId xmlns="" xmlns:a16="http://schemas.microsoft.com/office/drawing/2014/main" id="{0540E7B9-9AC6-4E42-A931-6FF91E6494A1}"/>
+                <a16:creationId xmlns:a16="http://schemas.microsoft.com/office/drawing/2014/main" xmlns="" id="{0540E7B9-9AC6-4E42-A931-6FF91E6494A1}"/>
               </a:ext>
             </a:extLst>
           </p:cNvPr>
@@ -2021,7 +2021,7 @@
           <p:cNvPr id="6" name="Slide Number Placeholder 5">
             <a:extLst>
               <a:ext uri="{FF2B5EF4-FFF2-40B4-BE49-F238E27FC236}">
-                <a16:creationId xmlns="" xmlns:a16="http://schemas.microsoft.com/office/drawing/2014/main" id="{FB16D645-6420-4785-8316-43EF780FA589}"/>
+                <a16:creationId xmlns:a16="http://schemas.microsoft.com/office/drawing/2014/main" xmlns="" id="{FB16D645-6420-4785-8316-43EF780FA589}"/>
               </a:ext>
             </a:extLst>
           </p:cNvPr>
@@ -2066,7 +2066,7 @@
           <p:cNvPr id="8" name="Picture 7" descr="A picture containing drawing&#10;&#10;Description automatically generated">
             <a:extLst>
               <a:ext uri="{FF2B5EF4-FFF2-40B4-BE49-F238E27FC236}">
-                <a16:creationId xmlns="" xmlns:a16="http://schemas.microsoft.com/office/drawing/2014/main" id="{BCCF2CA0-CCE3-4304-8F31-4D1CC50BCBDE}"/>
+                <a16:creationId xmlns:a16="http://schemas.microsoft.com/office/drawing/2014/main" xmlns="" id="{BCCF2CA0-CCE3-4304-8F31-4D1CC50BCBDE}"/>
               </a:ext>
             </a:extLst>
           </p:cNvPr>
@@ -2140,7 +2140,7 @@
           <p:cNvPr id="3" name="Subtitle 2">
             <a:extLst>
               <a:ext uri="{FF2B5EF4-FFF2-40B4-BE49-F238E27FC236}">
-                <a16:creationId xmlns="" xmlns:a16="http://schemas.microsoft.com/office/drawing/2014/main" id="{E2C6B9F5-608F-4534-96F0-C3A5E1A638A6}"/>
+                <a16:creationId xmlns:a16="http://schemas.microsoft.com/office/drawing/2014/main" xmlns="" id="{E2C6B9F5-608F-4534-96F0-C3A5E1A638A6}"/>
               </a:ext>
             </a:extLst>
           </p:cNvPr>
@@ -2217,7 +2217,7 @@
           <p:cNvPr id="5" name="Footer Placeholder 4">
             <a:extLst>
               <a:ext uri="{FF2B5EF4-FFF2-40B4-BE49-F238E27FC236}">
-                <a16:creationId xmlns="" xmlns:a16="http://schemas.microsoft.com/office/drawing/2014/main" id="{0540E7B9-9AC6-4E42-A931-6FF91E6494A1}"/>
+                <a16:creationId xmlns:a16="http://schemas.microsoft.com/office/drawing/2014/main" xmlns="" id="{0540E7B9-9AC6-4E42-A931-6FF91E6494A1}"/>
               </a:ext>
             </a:extLst>
           </p:cNvPr>
@@ -2260,7 +2260,7 @@
           <p:cNvPr id="6" name="Slide Number Placeholder 5">
             <a:extLst>
               <a:ext uri="{FF2B5EF4-FFF2-40B4-BE49-F238E27FC236}">
-                <a16:creationId xmlns="" xmlns:a16="http://schemas.microsoft.com/office/drawing/2014/main" id="{FB16D645-6420-4785-8316-43EF780FA589}"/>
+                <a16:creationId xmlns:a16="http://schemas.microsoft.com/office/drawing/2014/main" xmlns="" id="{FB16D645-6420-4785-8316-43EF780FA589}"/>
               </a:ext>
             </a:extLst>
           </p:cNvPr>
@@ -2305,7 +2305,7 @@
           <p:cNvPr id="9" name="Title 1">
             <a:extLst>
               <a:ext uri="{FF2B5EF4-FFF2-40B4-BE49-F238E27FC236}">
-                <a16:creationId xmlns="" xmlns:a16="http://schemas.microsoft.com/office/drawing/2014/main" id="{E9449821-0D0D-644D-97A3-D56097A9C6DA}"/>
+                <a16:creationId xmlns:a16="http://schemas.microsoft.com/office/drawing/2014/main" xmlns="" id="{E9449821-0D0D-644D-97A3-D56097A9C6DA}"/>
               </a:ext>
             </a:extLst>
           </p:cNvPr>
@@ -2352,7 +2352,7 @@
           <p:cNvPr id="10" name="Rectangle 9">
             <a:extLst>
               <a:ext uri="{FF2B5EF4-FFF2-40B4-BE49-F238E27FC236}">
-                <a16:creationId xmlns="" xmlns:a16="http://schemas.microsoft.com/office/drawing/2014/main" id="{44F6EB17-8019-7B4E-B53C-76B057A7C31F}"/>
+                <a16:creationId xmlns:a16="http://schemas.microsoft.com/office/drawing/2014/main" xmlns="" id="{44F6EB17-8019-7B4E-B53C-76B057A7C31F}"/>
               </a:ext>
             </a:extLst>
           </p:cNvPr>
@@ -2408,7 +2408,7 @@
           <p:cNvPr id="11" name="Picture 10">
             <a:extLst>
               <a:ext uri="{FF2B5EF4-FFF2-40B4-BE49-F238E27FC236}">
-                <a16:creationId xmlns="" xmlns:a16="http://schemas.microsoft.com/office/drawing/2014/main" id="{0503EF50-F00F-9643-BE53-F0A5272FC4B2}"/>
+                <a16:creationId xmlns:a16="http://schemas.microsoft.com/office/drawing/2014/main" xmlns="" id="{0503EF50-F00F-9643-BE53-F0A5272FC4B2}"/>
               </a:ext>
             </a:extLst>
           </p:cNvPr>
@@ -2476,7 +2476,7 @@
           <p:cNvPr id="2" name="Title 1">
             <a:extLst>
               <a:ext uri="{FF2B5EF4-FFF2-40B4-BE49-F238E27FC236}">
-                <a16:creationId xmlns="" xmlns:a16="http://schemas.microsoft.com/office/drawing/2014/main" id="{A1AAFE49-0143-472F-897B-A7DAB87AB4E4}"/>
+                <a16:creationId xmlns:a16="http://schemas.microsoft.com/office/drawing/2014/main" xmlns="" id="{A1AAFE49-0143-472F-897B-A7DAB87AB4E4}"/>
               </a:ext>
             </a:extLst>
           </p:cNvPr>
@@ -2505,7 +2505,7 @@
           <p:cNvPr id="3" name="Content Placeholder 2">
             <a:extLst>
               <a:ext uri="{FF2B5EF4-FFF2-40B4-BE49-F238E27FC236}">
-                <a16:creationId xmlns="" xmlns:a16="http://schemas.microsoft.com/office/drawing/2014/main" id="{981FBDFA-876B-4255-A301-F62F1EDD8D66}"/>
+                <a16:creationId xmlns:a16="http://schemas.microsoft.com/office/drawing/2014/main" xmlns="" id="{981FBDFA-876B-4255-A301-F62F1EDD8D66}"/>
               </a:ext>
             </a:extLst>
           </p:cNvPr>
@@ -2565,7 +2565,7 @@
           <p:cNvPr id="4" name="Content Placeholder 3">
             <a:extLst>
               <a:ext uri="{FF2B5EF4-FFF2-40B4-BE49-F238E27FC236}">
-                <a16:creationId xmlns="" xmlns:a16="http://schemas.microsoft.com/office/drawing/2014/main" id="{46F0C709-1F3D-4B13-A290-4041A33FB10E}"/>
+                <a16:creationId xmlns:a16="http://schemas.microsoft.com/office/drawing/2014/main" xmlns="" id="{46F0C709-1F3D-4B13-A290-4041A33FB10E}"/>
               </a:ext>
             </a:extLst>
           </p:cNvPr>
@@ -2656,7 +2656,7 @@
           <p:cNvPr id="6" name="Footer Placeholder 5">
             <a:extLst>
               <a:ext uri="{FF2B5EF4-FFF2-40B4-BE49-F238E27FC236}">
-                <a16:creationId xmlns="" xmlns:a16="http://schemas.microsoft.com/office/drawing/2014/main" id="{60A8C9C5-E913-47B9-82DE-196768E6D657}"/>
+                <a16:creationId xmlns:a16="http://schemas.microsoft.com/office/drawing/2014/main" xmlns="" id="{60A8C9C5-E913-47B9-82DE-196768E6D657}"/>
               </a:ext>
             </a:extLst>
           </p:cNvPr>
@@ -2684,7 +2684,7 @@
           <p:cNvPr id="7" name="Slide Number Placeholder 6">
             <a:extLst>
               <a:ext uri="{FF2B5EF4-FFF2-40B4-BE49-F238E27FC236}">
-                <a16:creationId xmlns="" xmlns:a16="http://schemas.microsoft.com/office/drawing/2014/main" id="{E1558F66-ECA3-4B00-A383-8D2B86217C93}"/>
+                <a16:creationId xmlns:a16="http://schemas.microsoft.com/office/drawing/2014/main" xmlns="" id="{E1558F66-ECA3-4B00-A383-8D2B86217C93}"/>
               </a:ext>
             </a:extLst>
           </p:cNvPr>
@@ -2714,7 +2714,7 @@
           <p:cNvPr id="8" name="Rectangle 7">
             <a:extLst>
               <a:ext uri="{FF2B5EF4-FFF2-40B4-BE49-F238E27FC236}">
-                <a16:creationId xmlns="" xmlns:a16="http://schemas.microsoft.com/office/drawing/2014/main" id="{62A19DAE-53D8-4F04-A4B9-B6EDFC23886D}"/>
+                <a16:creationId xmlns:a16="http://schemas.microsoft.com/office/drawing/2014/main" xmlns="" id="{62A19DAE-53D8-4F04-A4B9-B6EDFC23886D}"/>
               </a:ext>
             </a:extLst>
           </p:cNvPr>
@@ -2829,7 +2829,7 @@
           <p:cNvPr id="2" name="Title 1">
             <a:extLst>
               <a:ext uri="{FF2B5EF4-FFF2-40B4-BE49-F238E27FC236}">
-                <a16:creationId xmlns="" xmlns:a16="http://schemas.microsoft.com/office/drawing/2014/main" id="{A4DE70B5-BA04-4DB3-853D-A1C05ADF828C}"/>
+                <a16:creationId xmlns:a16="http://schemas.microsoft.com/office/drawing/2014/main" xmlns="" id="{A4DE70B5-BA04-4DB3-853D-A1C05ADF828C}"/>
               </a:ext>
             </a:extLst>
           </p:cNvPr>
@@ -2858,7 +2858,7 @@
           <p:cNvPr id="3" name="Content Placeholder 2">
             <a:extLst>
               <a:ext uri="{FF2B5EF4-FFF2-40B4-BE49-F238E27FC236}">
-                <a16:creationId xmlns="" xmlns:a16="http://schemas.microsoft.com/office/drawing/2014/main" id="{70440712-862D-4568-80A4-86117B896766}"/>
+                <a16:creationId xmlns:a16="http://schemas.microsoft.com/office/drawing/2014/main" xmlns="" id="{70440712-862D-4568-80A4-86117B896766}"/>
               </a:ext>
             </a:extLst>
           </p:cNvPr>
@@ -2915,7 +2915,7 @@
           <p:cNvPr id="5" name="Footer Placeholder 4">
             <a:extLst>
               <a:ext uri="{FF2B5EF4-FFF2-40B4-BE49-F238E27FC236}">
-                <a16:creationId xmlns="" xmlns:a16="http://schemas.microsoft.com/office/drawing/2014/main" id="{962B6D5D-0892-4B4E-86D9-894852B1242C}"/>
+                <a16:creationId xmlns:a16="http://schemas.microsoft.com/office/drawing/2014/main" xmlns="" id="{962B6D5D-0892-4B4E-86D9-894852B1242C}"/>
               </a:ext>
             </a:extLst>
           </p:cNvPr>
@@ -2943,7 +2943,7 @@
           <p:cNvPr id="6" name="Slide Number Placeholder 5">
             <a:extLst>
               <a:ext uri="{FF2B5EF4-FFF2-40B4-BE49-F238E27FC236}">
-                <a16:creationId xmlns="" xmlns:a16="http://schemas.microsoft.com/office/drawing/2014/main" id="{3B7428FC-C061-4730-9EA5-A52A00413991}"/>
+                <a16:creationId xmlns:a16="http://schemas.microsoft.com/office/drawing/2014/main" xmlns="" id="{3B7428FC-C061-4730-9EA5-A52A00413991}"/>
               </a:ext>
             </a:extLst>
           </p:cNvPr>
@@ -2973,7 +2973,7 @@
           <p:cNvPr id="7" name="Rectangle 6">
             <a:extLst>
               <a:ext uri="{FF2B5EF4-FFF2-40B4-BE49-F238E27FC236}">
-                <a16:creationId xmlns="" xmlns:a16="http://schemas.microsoft.com/office/drawing/2014/main" id="{850AA271-B0BA-42CD-A544-17AAB1FA2EEA}"/>
+                <a16:creationId xmlns:a16="http://schemas.microsoft.com/office/drawing/2014/main" xmlns="" id="{850AA271-B0BA-42CD-A544-17AAB1FA2EEA}"/>
               </a:ext>
             </a:extLst>
           </p:cNvPr>
@@ -3063,7 +3063,7 @@
           <p:cNvPr id="2" name="Title 1">
             <a:extLst>
               <a:ext uri="{FF2B5EF4-FFF2-40B4-BE49-F238E27FC236}">
-                <a16:creationId xmlns="" xmlns:a16="http://schemas.microsoft.com/office/drawing/2014/main" id="{A4DE70B5-BA04-4DB3-853D-A1C05ADF828C}"/>
+                <a16:creationId xmlns:a16="http://schemas.microsoft.com/office/drawing/2014/main" xmlns="" id="{A4DE70B5-BA04-4DB3-853D-A1C05ADF828C}"/>
               </a:ext>
             </a:extLst>
           </p:cNvPr>
@@ -3097,7 +3097,7 @@
           <p:cNvPr id="3" name="Content Placeholder 2">
             <a:extLst>
               <a:ext uri="{FF2B5EF4-FFF2-40B4-BE49-F238E27FC236}">
-                <a16:creationId xmlns="" xmlns:a16="http://schemas.microsoft.com/office/drawing/2014/main" id="{70440712-862D-4568-80A4-86117B896766}"/>
+                <a16:creationId xmlns:a16="http://schemas.microsoft.com/office/drawing/2014/main" xmlns="" id="{70440712-862D-4568-80A4-86117B896766}"/>
               </a:ext>
             </a:extLst>
           </p:cNvPr>
@@ -3154,7 +3154,7 @@
           <p:cNvPr id="6" name="Slide Number Placeholder 5">
             <a:extLst>
               <a:ext uri="{FF2B5EF4-FFF2-40B4-BE49-F238E27FC236}">
-                <a16:creationId xmlns="" xmlns:a16="http://schemas.microsoft.com/office/drawing/2014/main" id="{3B7428FC-C061-4730-9EA5-A52A00413991}"/>
+                <a16:creationId xmlns:a16="http://schemas.microsoft.com/office/drawing/2014/main" xmlns="" id="{3B7428FC-C061-4730-9EA5-A52A00413991}"/>
               </a:ext>
             </a:extLst>
           </p:cNvPr>
@@ -3184,7 +3184,7 @@
           <p:cNvPr id="7" name="Rectangle 6">
             <a:extLst>
               <a:ext uri="{FF2B5EF4-FFF2-40B4-BE49-F238E27FC236}">
-                <a16:creationId xmlns="" xmlns:a16="http://schemas.microsoft.com/office/drawing/2014/main" id="{850AA271-B0BA-42CD-A544-17AAB1FA2EEA}"/>
+                <a16:creationId xmlns:a16="http://schemas.microsoft.com/office/drawing/2014/main" xmlns="" id="{850AA271-B0BA-42CD-A544-17AAB1FA2EEA}"/>
               </a:ext>
             </a:extLst>
           </p:cNvPr>
@@ -3274,7 +3274,7 @@
           <p:cNvPr id="6" name="Slide Number Placeholder 5">
             <a:extLst>
               <a:ext uri="{FF2B5EF4-FFF2-40B4-BE49-F238E27FC236}">
-                <a16:creationId xmlns="" xmlns:a16="http://schemas.microsoft.com/office/drawing/2014/main" id="{3B7428FC-C061-4730-9EA5-A52A00413991}"/>
+                <a16:creationId xmlns:a16="http://schemas.microsoft.com/office/drawing/2014/main" xmlns="" id="{3B7428FC-C061-4730-9EA5-A52A00413991}"/>
               </a:ext>
             </a:extLst>
           </p:cNvPr>
@@ -3312,7 +3312,7 @@
           <p:cNvPr id="8" name="Content Placeholder 2">
             <a:extLst>
               <a:ext uri="{FF2B5EF4-FFF2-40B4-BE49-F238E27FC236}">
-                <a16:creationId xmlns="" xmlns:a16="http://schemas.microsoft.com/office/drawing/2014/main" id="{B09D4C03-E8B1-644E-949B-F7AF91181833}"/>
+                <a16:creationId xmlns:a16="http://schemas.microsoft.com/office/drawing/2014/main" xmlns="" id="{B09D4C03-E8B1-644E-949B-F7AF91181833}"/>
               </a:ext>
             </a:extLst>
           </p:cNvPr>
@@ -3385,7 +3385,7 @@
           <p:cNvPr id="5" name="Title 1">
             <a:extLst>
               <a:ext uri="{FF2B5EF4-FFF2-40B4-BE49-F238E27FC236}">
-                <a16:creationId xmlns="" xmlns:a16="http://schemas.microsoft.com/office/drawing/2014/main" id="{02EDA17D-AAE6-954F-93C6-90B8D7B80BD1}"/>
+                <a16:creationId xmlns:a16="http://schemas.microsoft.com/office/drawing/2014/main" xmlns="" id="{02EDA17D-AAE6-954F-93C6-90B8D7B80BD1}"/>
               </a:ext>
             </a:extLst>
           </p:cNvPr>
@@ -3465,7 +3465,7 @@
           <p:cNvPr id="2" name="Title 1">
             <a:extLst>
               <a:ext uri="{FF2B5EF4-FFF2-40B4-BE49-F238E27FC236}">
-                <a16:creationId xmlns="" xmlns:a16="http://schemas.microsoft.com/office/drawing/2014/main" id="{A1AAFE49-0143-472F-897B-A7DAB87AB4E4}"/>
+                <a16:creationId xmlns:a16="http://schemas.microsoft.com/office/drawing/2014/main" xmlns="" id="{A1AAFE49-0143-472F-897B-A7DAB87AB4E4}"/>
               </a:ext>
             </a:extLst>
           </p:cNvPr>
@@ -3494,7 +3494,7 @@
           <p:cNvPr id="4" name="Content Placeholder 3">
             <a:extLst>
               <a:ext uri="{FF2B5EF4-FFF2-40B4-BE49-F238E27FC236}">
-                <a16:creationId xmlns="" xmlns:a16="http://schemas.microsoft.com/office/drawing/2014/main" id="{46F0C709-1F3D-4B13-A290-4041A33FB10E}"/>
+                <a16:creationId xmlns:a16="http://schemas.microsoft.com/office/drawing/2014/main" xmlns="" id="{46F0C709-1F3D-4B13-A290-4041A33FB10E}"/>
               </a:ext>
             </a:extLst>
           </p:cNvPr>
@@ -3555,7 +3555,7 @@
           <p:cNvPr id="6" name="Footer Placeholder 5">
             <a:extLst>
               <a:ext uri="{FF2B5EF4-FFF2-40B4-BE49-F238E27FC236}">
-                <a16:creationId xmlns="" xmlns:a16="http://schemas.microsoft.com/office/drawing/2014/main" id="{60A8C9C5-E913-47B9-82DE-196768E6D657}"/>
+                <a16:creationId xmlns:a16="http://schemas.microsoft.com/office/drawing/2014/main" xmlns="" id="{60A8C9C5-E913-47B9-82DE-196768E6D657}"/>
               </a:ext>
             </a:extLst>
           </p:cNvPr>
@@ -3583,7 +3583,7 @@
           <p:cNvPr id="7" name="Slide Number Placeholder 6">
             <a:extLst>
               <a:ext uri="{FF2B5EF4-FFF2-40B4-BE49-F238E27FC236}">
-                <a16:creationId xmlns="" xmlns:a16="http://schemas.microsoft.com/office/drawing/2014/main" id="{E1558F66-ECA3-4B00-A383-8D2B86217C93}"/>
+                <a16:creationId xmlns:a16="http://schemas.microsoft.com/office/drawing/2014/main" xmlns="" id="{E1558F66-ECA3-4B00-A383-8D2B86217C93}"/>
               </a:ext>
             </a:extLst>
           </p:cNvPr>
@@ -3613,7 +3613,7 @@
           <p:cNvPr id="10" name="Picture Placeholder 9">
             <a:extLst>
               <a:ext uri="{FF2B5EF4-FFF2-40B4-BE49-F238E27FC236}">
-                <a16:creationId xmlns="" xmlns:a16="http://schemas.microsoft.com/office/drawing/2014/main" id="{874043F1-6F14-49BD-83CA-12B559ABC101}"/>
+                <a16:creationId xmlns:a16="http://schemas.microsoft.com/office/drawing/2014/main" xmlns="" id="{874043F1-6F14-49BD-83CA-12B559ABC101}"/>
               </a:ext>
             </a:extLst>
           </p:cNvPr>
@@ -3643,7 +3643,7 @@
           <p:cNvPr id="11" name="Rectangle 10">
             <a:extLst>
               <a:ext uri="{FF2B5EF4-FFF2-40B4-BE49-F238E27FC236}">
-                <a16:creationId xmlns="" xmlns:a16="http://schemas.microsoft.com/office/drawing/2014/main" id="{4B51C537-0174-43E5-8B81-C80AF1D06831}"/>
+                <a16:creationId xmlns:a16="http://schemas.microsoft.com/office/drawing/2014/main" xmlns="" id="{4B51C537-0174-43E5-8B81-C80AF1D06831}"/>
               </a:ext>
             </a:extLst>
           </p:cNvPr>
@@ -3733,7 +3733,7 @@
           <p:cNvPr id="2" name="Title 1">
             <a:extLst>
               <a:ext uri="{FF2B5EF4-FFF2-40B4-BE49-F238E27FC236}">
-                <a16:creationId xmlns="" xmlns:a16="http://schemas.microsoft.com/office/drawing/2014/main" id="{A1AAFE49-0143-472F-897B-A7DAB87AB4E4}"/>
+                <a16:creationId xmlns:a16="http://schemas.microsoft.com/office/drawing/2014/main" xmlns="" id="{A1AAFE49-0143-472F-897B-A7DAB87AB4E4}"/>
               </a:ext>
             </a:extLst>
           </p:cNvPr>
@@ -3762,7 +3762,7 @@
           <p:cNvPr id="6" name="Footer Placeholder 5">
             <a:extLst>
               <a:ext uri="{FF2B5EF4-FFF2-40B4-BE49-F238E27FC236}">
-                <a16:creationId xmlns="" xmlns:a16="http://schemas.microsoft.com/office/drawing/2014/main" id="{60A8C9C5-E913-47B9-82DE-196768E6D657}"/>
+                <a16:creationId xmlns:a16="http://schemas.microsoft.com/office/drawing/2014/main" xmlns="" id="{60A8C9C5-E913-47B9-82DE-196768E6D657}"/>
               </a:ext>
             </a:extLst>
           </p:cNvPr>
@@ -3790,7 +3790,7 @@
           <p:cNvPr id="7" name="Slide Number Placeholder 6">
             <a:extLst>
               <a:ext uri="{FF2B5EF4-FFF2-40B4-BE49-F238E27FC236}">
-                <a16:creationId xmlns="" xmlns:a16="http://schemas.microsoft.com/office/drawing/2014/main" id="{E1558F66-ECA3-4B00-A383-8D2B86217C93}"/>
+                <a16:creationId xmlns:a16="http://schemas.microsoft.com/office/drawing/2014/main" xmlns="" id="{E1558F66-ECA3-4B00-A383-8D2B86217C93}"/>
               </a:ext>
             </a:extLst>
           </p:cNvPr>
@@ -3820,7 +3820,7 @@
           <p:cNvPr id="8" name="Rectangle 7">
             <a:extLst>
               <a:ext uri="{FF2B5EF4-FFF2-40B4-BE49-F238E27FC236}">
-                <a16:creationId xmlns="" xmlns:a16="http://schemas.microsoft.com/office/drawing/2014/main" id="{039FCF96-B7D6-4CCD-A4AE-46A67249D3BD}"/>
+                <a16:creationId xmlns:a16="http://schemas.microsoft.com/office/drawing/2014/main" xmlns="" id="{039FCF96-B7D6-4CCD-A4AE-46A67249D3BD}"/>
               </a:ext>
             </a:extLst>
           </p:cNvPr>
@@ -3872,7 +3872,7 @@
           <p:cNvPr id="10" name="Content Placeholder 9">
             <a:extLst>
               <a:ext uri="{FF2B5EF4-FFF2-40B4-BE49-F238E27FC236}">
-                <a16:creationId xmlns="" xmlns:a16="http://schemas.microsoft.com/office/drawing/2014/main" id="{741F3B7A-B2BF-40FC-8EB2-F1C37D316488}"/>
+                <a16:creationId xmlns:a16="http://schemas.microsoft.com/office/drawing/2014/main" xmlns="" id="{741F3B7A-B2BF-40FC-8EB2-F1C37D316488}"/>
               </a:ext>
             </a:extLst>
           </p:cNvPr>
@@ -3933,7 +3933,7 @@
           <p:cNvPr id="9" name="Content Placeholder 9">
             <a:extLst>
               <a:ext uri="{FF2B5EF4-FFF2-40B4-BE49-F238E27FC236}">
-                <a16:creationId xmlns="" xmlns:a16="http://schemas.microsoft.com/office/drawing/2014/main" id="{75B7A667-B99F-7A41-AAC3-ED24B9B1D92E}"/>
+                <a16:creationId xmlns:a16="http://schemas.microsoft.com/office/drawing/2014/main" xmlns="" id="{75B7A667-B99F-7A41-AAC3-ED24B9B1D92E}"/>
               </a:ext>
             </a:extLst>
           </p:cNvPr>
@@ -3994,7 +3994,7 @@
           <p:cNvPr id="11" name="Content Placeholder 9">
             <a:extLst>
               <a:ext uri="{FF2B5EF4-FFF2-40B4-BE49-F238E27FC236}">
-                <a16:creationId xmlns="" xmlns:a16="http://schemas.microsoft.com/office/drawing/2014/main" id="{93C1FF47-695D-B348-AF37-1ADF5736FA9E}"/>
+                <a16:creationId xmlns:a16="http://schemas.microsoft.com/office/drawing/2014/main" xmlns="" id="{93C1FF47-695D-B348-AF37-1ADF5736FA9E}"/>
               </a:ext>
             </a:extLst>
           </p:cNvPr>
@@ -4090,7 +4090,7 @@
           <p:cNvPr id="2" name="Title Placeholder 1">
             <a:extLst>
               <a:ext uri="{FF2B5EF4-FFF2-40B4-BE49-F238E27FC236}">
-                <a16:creationId xmlns="" xmlns:a16="http://schemas.microsoft.com/office/drawing/2014/main" id="{DB1A62CF-E2B4-496D-829D-DCE37260977D}"/>
+                <a16:creationId xmlns:a16="http://schemas.microsoft.com/office/drawing/2014/main" xmlns="" id="{DB1A62CF-E2B4-496D-829D-DCE37260977D}"/>
               </a:ext>
             </a:extLst>
           </p:cNvPr>
@@ -4129,7 +4129,7 @@
           <p:cNvPr id="3" name="Text Placeholder 2">
             <a:extLst>
               <a:ext uri="{FF2B5EF4-FFF2-40B4-BE49-F238E27FC236}">
-                <a16:creationId xmlns="" xmlns:a16="http://schemas.microsoft.com/office/drawing/2014/main" id="{DFD84EF4-0E07-4BF3-A4AB-3E8632AA79AD}"/>
+                <a16:creationId xmlns:a16="http://schemas.microsoft.com/office/drawing/2014/main" xmlns="" id="{DFD84EF4-0E07-4BF3-A4AB-3E8632AA79AD}"/>
               </a:ext>
             </a:extLst>
           </p:cNvPr>
@@ -4197,7 +4197,7 @@
           <p:cNvPr id="5" name="Footer Placeholder 4">
             <a:extLst>
               <a:ext uri="{FF2B5EF4-FFF2-40B4-BE49-F238E27FC236}">
-                <a16:creationId xmlns="" xmlns:a16="http://schemas.microsoft.com/office/drawing/2014/main" id="{3B527A5D-B761-4C2F-97E6-5D8254424B8B}"/>
+                <a16:creationId xmlns:a16="http://schemas.microsoft.com/office/drawing/2014/main" xmlns="" id="{3B527A5D-B761-4C2F-97E6-5D8254424B8B}"/>
               </a:ext>
             </a:extLst>
           </p:cNvPr>
@@ -4245,7 +4245,7 @@
           <p:cNvPr id="6" name="Slide Number Placeholder 5">
             <a:extLst>
               <a:ext uri="{FF2B5EF4-FFF2-40B4-BE49-F238E27FC236}">
-                <a16:creationId xmlns="" xmlns:a16="http://schemas.microsoft.com/office/drawing/2014/main" id="{9CD661B1-4E4B-4F85-ACA3-C34023D70282}"/>
+                <a16:creationId xmlns:a16="http://schemas.microsoft.com/office/drawing/2014/main" xmlns="" id="{9CD661B1-4E4B-4F85-ACA3-C34023D70282}"/>
               </a:ext>
             </a:extLst>
           </p:cNvPr>
@@ -4674,7 +4674,7 @@
           <p:cNvPr id="2" name="Subtitle 1">
             <a:extLst>
               <a:ext uri="{FF2B5EF4-FFF2-40B4-BE49-F238E27FC236}">
-                <a16:creationId xmlns="" xmlns:a16="http://schemas.microsoft.com/office/drawing/2014/main" id="{6A29D8FC-E32A-5566-0930-02B99F5763A6}"/>
+                <a16:creationId xmlns:a16="http://schemas.microsoft.com/office/drawing/2014/main" xmlns="" id="{6A29D8FC-E32A-5566-0930-02B99F5763A6}"/>
               </a:ext>
             </a:extLst>
           </p:cNvPr>
@@ -4707,7 +4707,7 @@
           <p:cNvPr id="4" name="Slide Number Placeholder 3">
             <a:extLst>
               <a:ext uri="{FF2B5EF4-FFF2-40B4-BE49-F238E27FC236}">
-                <a16:creationId xmlns="" xmlns:a16="http://schemas.microsoft.com/office/drawing/2014/main" id="{E143B824-C7FA-8427-0A8B-E8B5D7787B83}"/>
+                <a16:creationId xmlns:a16="http://schemas.microsoft.com/office/drawing/2014/main" xmlns="" id="{E143B824-C7FA-8427-0A8B-E8B5D7787B83}"/>
               </a:ext>
             </a:extLst>
           </p:cNvPr>
@@ -4737,7 +4737,7 @@
           <p:cNvPr id="6" name="TextBox 5">
             <a:extLst>
               <a:ext uri="{FF2B5EF4-FFF2-40B4-BE49-F238E27FC236}">
-                <a16:creationId xmlns="" xmlns:a16="http://schemas.microsoft.com/office/drawing/2014/main" id="{6DD9461E-8553-F8C3-E23F-FB71330E931F}"/>
+                <a16:creationId xmlns:a16="http://schemas.microsoft.com/office/drawing/2014/main" xmlns="" id="{6DD9461E-8553-F8C3-E23F-FB71330E931F}"/>
               </a:ext>
             </a:extLst>
           </p:cNvPr>
@@ -4879,7 +4879,7 @@
           <p:cNvPr id="2" name="Title 1">
             <a:extLst>
               <a:ext uri="{FF2B5EF4-FFF2-40B4-BE49-F238E27FC236}">
-                <a16:creationId xmlns="" xmlns:a16="http://schemas.microsoft.com/office/drawing/2014/main" id="{3440AEE4-CC66-FE42-B0C3-2CC7AFD37D1C}"/>
+                <a16:creationId xmlns:a16="http://schemas.microsoft.com/office/drawing/2014/main" xmlns="" id="{3440AEE4-CC66-FE42-B0C3-2CC7AFD37D1C}"/>
               </a:ext>
             </a:extLst>
           </p:cNvPr>
@@ -4935,7 +4935,7 @@
           <p:cNvPr id="3" name="Subtitle 2">
             <a:extLst>
               <a:ext uri="{FF2B5EF4-FFF2-40B4-BE49-F238E27FC236}">
-                <a16:creationId xmlns="" xmlns:a16="http://schemas.microsoft.com/office/drawing/2014/main" id="{8275DA97-5166-7F4B-BC83-F50AC8BEDCD7}"/>
+                <a16:creationId xmlns:a16="http://schemas.microsoft.com/office/drawing/2014/main" xmlns="" id="{8275DA97-5166-7F4B-BC83-F50AC8BEDCD7}"/>
               </a:ext>
             </a:extLst>
           </p:cNvPr>
@@ -4976,7 +4976,7 @@
           <p:cNvPr id="4" name="Footer Placeholder 3">
             <a:extLst>
               <a:ext uri="{FF2B5EF4-FFF2-40B4-BE49-F238E27FC236}">
-                <a16:creationId xmlns="" xmlns:a16="http://schemas.microsoft.com/office/drawing/2014/main" id="{6E7F4D14-5620-EC41-A86C-6CC3CFD691B4}"/>
+                <a16:creationId xmlns:a16="http://schemas.microsoft.com/office/drawing/2014/main" xmlns="" id="{6E7F4D14-5620-EC41-A86C-6CC3CFD691B4}"/>
               </a:ext>
             </a:extLst>
           </p:cNvPr>
@@ -5140,7 +5140,7 @@
           <p:cNvPr id="3" name="Footer Placeholder 2">
             <a:extLst>
               <a:ext uri="{FF2B5EF4-FFF2-40B4-BE49-F238E27FC236}">
-                <a16:creationId xmlns="" xmlns:a16="http://schemas.microsoft.com/office/drawing/2014/main" id="{1E32129C-44C2-95DE-7FB4-8025AAB3EA1F}"/>
+                <a16:creationId xmlns:a16="http://schemas.microsoft.com/office/drawing/2014/main" xmlns="" id="{1E32129C-44C2-95DE-7FB4-8025AAB3EA1F}"/>
               </a:ext>
             </a:extLst>
           </p:cNvPr>
@@ -5168,7 +5168,7 @@
           <p:cNvPr id="4" name="Slide Number Placeholder 3">
             <a:extLst>
               <a:ext uri="{FF2B5EF4-FFF2-40B4-BE49-F238E27FC236}">
-                <a16:creationId xmlns="" xmlns:a16="http://schemas.microsoft.com/office/drawing/2014/main" id="{9143F542-9925-BCBE-2DA4-35A32A38D9AD}"/>
+                <a16:creationId xmlns:a16="http://schemas.microsoft.com/office/drawing/2014/main" xmlns="" id="{9143F542-9925-BCBE-2DA4-35A32A38D9AD}"/>
               </a:ext>
             </a:extLst>
           </p:cNvPr>
@@ -5198,7 +5198,7 @@
           <p:cNvPr id="5" name="Title 4">
             <a:extLst>
               <a:ext uri="{FF2B5EF4-FFF2-40B4-BE49-F238E27FC236}">
-                <a16:creationId xmlns="" xmlns:a16="http://schemas.microsoft.com/office/drawing/2014/main" id="{FEF2E89F-D251-B0A8-2377-FD314948D49C}"/>
+                <a16:creationId xmlns:a16="http://schemas.microsoft.com/office/drawing/2014/main" xmlns="" id="{FEF2E89F-D251-B0A8-2377-FD314948D49C}"/>
               </a:ext>
             </a:extLst>
           </p:cNvPr>
@@ -5299,7 +5299,7 @@
           <p:cNvPr id="2" name="Subtitle 1">
             <a:extLst>
               <a:ext uri="{FF2B5EF4-FFF2-40B4-BE49-F238E27FC236}">
-                <a16:creationId xmlns="" xmlns:a16="http://schemas.microsoft.com/office/drawing/2014/main" id="{7D9D8228-727F-1E46-B5AD-91D158B8255E}"/>
+                <a16:creationId xmlns:a16="http://schemas.microsoft.com/office/drawing/2014/main" xmlns="" id="{7D9D8228-727F-1E46-B5AD-91D158B8255E}"/>
               </a:ext>
             </a:extLst>
           </p:cNvPr>
@@ -5363,7 +5363,7 @@
           <p:cNvPr id="4" name="Slide Number Placeholder 3">
             <a:extLst>
               <a:ext uri="{FF2B5EF4-FFF2-40B4-BE49-F238E27FC236}">
-                <a16:creationId xmlns="" xmlns:a16="http://schemas.microsoft.com/office/drawing/2014/main" id="{CC9D9611-42EE-7840-81EE-DD6B1A99CD7B}"/>
+                <a16:creationId xmlns:a16="http://schemas.microsoft.com/office/drawing/2014/main" xmlns="" id="{CC9D9611-42EE-7840-81EE-DD6B1A99CD7B}"/>
               </a:ext>
             </a:extLst>
           </p:cNvPr>
@@ -5397,7 +5397,7 @@
           <p:cNvPr id="5" name="Title 4">
             <a:extLst>
               <a:ext uri="{FF2B5EF4-FFF2-40B4-BE49-F238E27FC236}">
-                <a16:creationId xmlns="" xmlns:a16="http://schemas.microsoft.com/office/drawing/2014/main" id="{B3FA3829-F12C-214D-8FBA-7E1A740F65CA}"/>
+                <a16:creationId xmlns:a16="http://schemas.microsoft.com/office/drawing/2014/main" xmlns="" id="{B3FA3829-F12C-214D-8FBA-7E1A740F65CA}"/>
               </a:ext>
             </a:extLst>
           </p:cNvPr>
@@ -5705,7 +5705,7 @@
           <p:cNvPr id="2" name="Subtitle 1">
             <a:extLst>
               <a:ext uri="{FF2B5EF4-FFF2-40B4-BE49-F238E27FC236}">
-                <a16:creationId xmlns="" xmlns:a16="http://schemas.microsoft.com/office/drawing/2014/main" id="{8E3CD731-5ACF-B002-247D-243F6E2149EC}"/>
+                <a16:creationId xmlns:a16="http://schemas.microsoft.com/office/drawing/2014/main" xmlns="" id="{8E3CD731-5ACF-B002-247D-243F6E2149EC}"/>
               </a:ext>
             </a:extLst>
           </p:cNvPr>
@@ -5752,7 +5752,7 @@
           <p:cNvPr id="3" name="Footer Placeholder 2">
             <a:extLst>
               <a:ext uri="{FF2B5EF4-FFF2-40B4-BE49-F238E27FC236}">
-                <a16:creationId xmlns="" xmlns:a16="http://schemas.microsoft.com/office/drawing/2014/main" id="{3C4D431B-7665-75B0-2D73-5BD588DCB766}"/>
+                <a16:creationId xmlns:a16="http://schemas.microsoft.com/office/drawing/2014/main" xmlns="" id="{3C4D431B-7665-75B0-2D73-5BD588DCB766}"/>
               </a:ext>
             </a:extLst>
           </p:cNvPr>
@@ -5785,7 +5785,7 @@
           <p:cNvPr id="4" name="Slide Number Placeholder 3">
             <a:extLst>
               <a:ext uri="{FF2B5EF4-FFF2-40B4-BE49-F238E27FC236}">
-                <a16:creationId xmlns="" xmlns:a16="http://schemas.microsoft.com/office/drawing/2014/main" id="{1625FA15-B17F-387B-E383-5505647ABB89}"/>
+                <a16:creationId xmlns:a16="http://schemas.microsoft.com/office/drawing/2014/main" xmlns="" id="{1625FA15-B17F-387B-E383-5505647ABB89}"/>
               </a:ext>
             </a:extLst>
           </p:cNvPr>
@@ -5819,7 +5819,7 @@
           <p:cNvPr id="5" name="Title 4">
             <a:extLst>
               <a:ext uri="{FF2B5EF4-FFF2-40B4-BE49-F238E27FC236}">
-                <a16:creationId xmlns="" xmlns:a16="http://schemas.microsoft.com/office/drawing/2014/main" id="{3440DA25-F620-152B-DE9E-776F7B74DFF0}"/>
+                <a16:creationId xmlns:a16="http://schemas.microsoft.com/office/drawing/2014/main" xmlns="" id="{3440DA25-F620-152B-DE9E-776F7B74DFF0}"/>
               </a:ext>
             </a:extLst>
           </p:cNvPr>
@@ -5888,49 +5888,15 @@
               </a:rPr>
             </a:br>
             <a:r>
-              <a:rPr lang="en-IE" sz="2400" b="0" dirty="0" smtClean="0">
+              <a:rPr lang="en-IE" sz="2400" b="0" dirty="0">
                 <a:solidFill>
                   <a:srgbClr val="000000"/>
                 </a:solidFill>
-                <a:effectLst/>
                 <a:latin typeface="Calibri" panose="020F0502020204030204" pitchFamily="34" charset="0"/>
                 <a:ea typeface="Calibri" panose="020F0502020204030204" pitchFamily="34" charset="0"/>
                 <a:cs typeface="Times New Roman" panose="02020603050405020304" pitchFamily="18" charset="0"/>
               </a:rPr>
-              <a:t>Nominal </a:t>
-            </a:r>
-            <a:r>
-              <a:rPr lang="en-IE" sz="2400" b="0" dirty="0">
-                <a:solidFill>
-                  <a:srgbClr val="000000"/>
-                </a:solidFill>
-                <a:effectLst/>
-                <a:latin typeface="Calibri" panose="020F0502020204030204" pitchFamily="34" charset="0"/>
-                <a:ea typeface="Calibri" panose="020F0502020204030204" pitchFamily="34" charset="0"/>
-                <a:cs typeface="Times New Roman" panose="02020603050405020304" pitchFamily="18" charset="0"/>
-              </a:rPr>
-              <a:t>vs </a:t>
-            </a:r>
-            <a:r>
-              <a:rPr lang="en-IE" sz="2400" b="0" dirty="0" smtClean="0">
-                <a:solidFill>
-                  <a:srgbClr val="000000"/>
-                </a:solidFill>
-                <a:effectLst/>
-                <a:latin typeface="Calibri" panose="020F0502020204030204" pitchFamily="34" charset="0"/>
-                <a:ea typeface="Calibri" panose="020F0502020204030204" pitchFamily="34" charset="0"/>
-                <a:cs typeface="Times New Roman" panose="02020603050405020304" pitchFamily="18" charset="0"/>
-              </a:rPr>
-              <a:t>Interval data: “</a:t>
-            </a:r>
-            <a:r>
-              <a:rPr lang="en-IE" sz="2400" b="0" dirty="0">
-                <a:effectLst/>
-                <a:latin typeface="Calibri" panose="020F0502020204030204" pitchFamily="34" charset="0"/>
-                <a:ea typeface="Calibri" panose="020F0502020204030204" pitchFamily="34" charset="0"/>
-                <a:cs typeface="Times New Roman" panose="02020603050405020304" pitchFamily="18" charset="0"/>
-              </a:rPr>
-              <a:t>Is there a difference </a:t>
+              <a:t>Nominal vs Interval data: “</a:t>
             </a:r>
             <a:r>
               <a:rPr lang="en-IE" sz="2400" b="0" dirty="0">
@@ -5938,23 +5904,13 @@
                 <a:ea typeface="Calibri" panose="020F0502020204030204" pitchFamily="34" charset="0"/>
                 <a:cs typeface="Times New Roman" panose="02020603050405020304" pitchFamily="18" charset="0"/>
               </a:rPr>
-              <a:t>in the mean </a:t>
-            </a:r>
-            <a:r>
-              <a:rPr lang="en-IE" sz="2400" b="0" dirty="0" smtClean="0">
-                <a:effectLst/>
-                <a:latin typeface="Calibri" panose="020F0502020204030204" pitchFamily="34" charset="0"/>
-                <a:ea typeface="Calibri" panose="020F0502020204030204" pitchFamily="34" charset="0"/>
-                <a:cs typeface="Times New Roman" panose="02020603050405020304" pitchFamily="18" charset="0"/>
-              </a:rPr>
-              <a:t>of </a:t>
-            </a:r>
-            <a:r>
-              <a:rPr lang="en-IE" sz="2400" b="0" dirty="0" smtClean="0">
+              <a:t>Is there a difference in the mean of </a:t>
+            </a:r>
+            <a:r>
+              <a:rPr lang="en-IE" sz="2400" b="0" dirty="0">
                 <a:solidFill>
                   <a:srgbClr val="0070C0"/>
                 </a:solidFill>
-                <a:effectLst/>
                 <a:latin typeface="Calibri" panose="020F0502020204030204" pitchFamily="34" charset="0"/>
                 <a:ea typeface="Calibri" panose="020F0502020204030204" pitchFamily="34" charset="0"/>
                 <a:cs typeface="Times New Roman" panose="02020603050405020304" pitchFamily="18" charset="0"/>
@@ -5962,25 +5918,61 @@
               <a:t>Death </a:t>
             </a:r>
             <a:r>
-              <a:rPr lang="en-IE" sz="2400" b="0" dirty="0" smtClean="0">
-                <a:effectLst/>
+              <a:rPr lang="en-IE" sz="2400" b="0" dirty="0">
                 <a:latin typeface="Calibri" panose="020F0502020204030204" pitchFamily="34" charset="0"/>
                 <a:ea typeface="Calibri" panose="020F0502020204030204" pitchFamily="34" charset="0"/>
                 <a:cs typeface="Times New Roman" panose="02020603050405020304" pitchFamily="18" charset="0"/>
               </a:rPr>
-              <a:t>among </a:t>
-            </a:r>
-            <a:r>
-              <a:rPr lang="en-IE" sz="2400" b="0" dirty="0" smtClean="0">
+              <a:t>between two countries </a:t>
+            </a:r>
+            <a:r>
+              <a:rPr lang="en-IE" sz="2400" b="0" dirty="0">
                 <a:solidFill>
                   <a:srgbClr val="0070C0"/>
                 </a:solidFill>
-                <a:effectLst/>
                 <a:latin typeface="Calibri" panose="020F0502020204030204" pitchFamily="34" charset="0"/>
                 <a:ea typeface="Calibri" panose="020F0502020204030204" pitchFamily="34" charset="0"/>
                 <a:cs typeface="Times New Roman" panose="02020603050405020304" pitchFamily="18" charset="0"/>
               </a:rPr>
-              <a:t>Countries.</a:t>
+              <a:t>Guatemala </a:t>
+            </a:r>
+            <a:r>
+              <a:rPr lang="en-IE" sz="2400" b="0" dirty="0">
+                <a:latin typeface="Calibri" panose="020F0502020204030204" pitchFamily="34" charset="0"/>
+                <a:ea typeface="Calibri" panose="020F0502020204030204" pitchFamily="34" charset="0"/>
+                <a:cs typeface="Times New Roman" panose="02020603050405020304" pitchFamily="18" charset="0"/>
+              </a:rPr>
+              <a:t>and</a:t>
+            </a:r>
+            <a:r>
+              <a:rPr lang="en-IE" sz="2400" b="0" dirty="0">
+                <a:solidFill>
+                  <a:srgbClr val="0070C0"/>
+                </a:solidFill>
+                <a:latin typeface="Calibri" panose="020F0502020204030204" pitchFamily="34" charset="0"/>
+                <a:ea typeface="Calibri" panose="020F0502020204030204" pitchFamily="34" charset="0"/>
+                <a:cs typeface="Times New Roman" panose="02020603050405020304" pitchFamily="18" charset="0"/>
+              </a:rPr>
+              <a:t> South Africa</a:t>
+            </a:r>
+            <a:r>
+              <a:rPr lang="en-IE" sz="2400" b="0" dirty="0">
+                <a:latin typeface="Calibri" panose="020F0502020204030204" pitchFamily="34" charset="0"/>
+                <a:ea typeface="Calibri" panose="020F0502020204030204" pitchFamily="34" charset="0"/>
+                <a:cs typeface="Times New Roman" panose="02020603050405020304" pitchFamily="18" charset="0"/>
+              </a:rPr>
+              <a:t>?</a:t>
+            </a:r>
+            <a:r>
+              <a:rPr lang="en-IE" sz="2400" b="0" dirty="0">
+                <a:solidFill>
+                  <a:srgbClr val="0070C0"/>
+                </a:solidFill>
+                <a:latin typeface="Calibri" panose="020F0502020204030204" pitchFamily="34" charset="0"/>
+                <a:ea typeface="Calibri" panose="020F0502020204030204" pitchFamily="34" charset="0"/>
+                <a:cs typeface="Times New Roman" panose="02020603050405020304" pitchFamily="18" charset="0"/>
+              </a:rPr>
+              <a:t>”</a:t>
             </a:r>
             <a:r>
               <a:rPr lang="en-GB" sz="2400" dirty="0">
@@ -6089,7 +6081,7 @@
           <p:cNvPr id="2" name="Subtitle 1">
             <a:extLst>
               <a:ext uri="{FF2B5EF4-FFF2-40B4-BE49-F238E27FC236}">
-                <a16:creationId xmlns="" xmlns:a16="http://schemas.microsoft.com/office/drawing/2014/main" id="{6B64221B-D6D4-E382-A91A-99FF908D5475}"/>
+                <a16:creationId xmlns:a16="http://schemas.microsoft.com/office/drawing/2014/main" xmlns="" id="{6B64221B-D6D4-E382-A91A-99FF908D5475}"/>
               </a:ext>
             </a:extLst>
           </p:cNvPr>
@@ -6143,7 +6135,7 @@
           <p:cNvPr id="4" name="Slide Number Placeholder 3">
             <a:extLst>
               <a:ext uri="{FF2B5EF4-FFF2-40B4-BE49-F238E27FC236}">
-                <a16:creationId xmlns="" xmlns:a16="http://schemas.microsoft.com/office/drawing/2014/main" id="{FF7EDF94-2B89-A21D-BBC0-E455C2D9893B}"/>
+                <a16:creationId xmlns:a16="http://schemas.microsoft.com/office/drawing/2014/main" xmlns="" id="{FF7EDF94-2B89-A21D-BBC0-E455C2D9893B}"/>
               </a:ext>
             </a:extLst>
           </p:cNvPr>
@@ -6177,7 +6169,7 @@
           <p:cNvPr id="9" name="Title 8">
             <a:extLst>
               <a:ext uri="{FF2B5EF4-FFF2-40B4-BE49-F238E27FC236}">
-                <a16:creationId xmlns="" xmlns:a16="http://schemas.microsoft.com/office/drawing/2014/main" id="{D1A8E56B-DFF3-4B99-A410-52B14F2E39E7}"/>
+                <a16:creationId xmlns:a16="http://schemas.microsoft.com/office/drawing/2014/main" xmlns="" id="{D1A8E56B-DFF3-4B99-A410-52B14F2E39E7}"/>
               </a:ext>
             </a:extLst>
           </p:cNvPr>
@@ -6211,116 +6203,70 @@
               </a:lnSpc>
             </a:pPr>
             <a:r>
-              <a:rPr lang="en-GB" sz="2000" b="0" spc="0" dirty="0">
-                <a:latin typeface="+mn-lt"/>
-              </a:rPr>
-              <a:t>1. </a:t>
-            </a:r>
-            <a:r>
-              <a:rPr lang="en-GB" sz="2000" b="0" spc="0" dirty="0" smtClean="0">
-                <a:latin typeface="+mn-lt"/>
-              </a:rPr>
-              <a:t> Null hypothesis (</a:t>
-            </a:r>
-            <a:r>
-              <a:rPr lang="en-GB" sz="2000" b="0" spc="0" dirty="0" err="1" smtClean="0">
-                <a:latin typeface="+mn-lt"/>
-              </a:rPr>
+              <a:rPr lang="en-GB" sz="2000" b="0" spc="0" dirty="0"/>
+              <a:t>1.  Null hypothesis (</a:t>
+            </a:r>
+            <a:r>
+              <a:rPr lang="en-GB" sz="2000" b="0" spc="0" dirty="0" err="1"/>
               <a:t>H</a:t>
             </a:r>
             <a:r>
-              <a:rPr lang="en-GB" sz="2000" b="0" i="1" spc="0" baseline="-25000" dirty="0" err="1" smtClean="0">
-                <a:latin typeface="+mn-lt"/>
-              </a:rPr>
+              <a:rPr lang="en-GB" sz="2000" b="0" i="1" spc="0" baseline="-25000" dirty="0" err="1"/>
               <a:t>o</a:t>
             </a:r>
             <a:r>
-              <a:rPr lang="en-GB" sz="2000" b="0" spc="0" dirty="0" smtClean="0">
-                <a:latin typeface="+mn-lt"/>
-              </a:rPr>
+              <a:rPr lang="en-GB" sz="2000" b="0" spc="0" dirty="0"/>
               <a:t>): </a:t>
             </a:r>
             <a:r>
-              <a:rPr lang="en-US" sz="2000" b="0" spc="0" dirty="0">
-                <a:latin typeface="+mn-lt"/>
-              </a:rPr>
-              <a:t>There is no </a:t>
-            </a:r>
-            <a:r>
-              <a:rPr lang="en-US" sz="2000" b="0" spc="0" dirty="0" smtClean="0">
-                <a:latin typeface="+mn-lt"/>
-              </a:rPr>
-              <a:t>difference </a:t>
-            </a:r>
-            <a:r>
-              <a:rPr lang="en-US" sz="2000" b="0" spc="0" dirty="0">
-                <a:latin typeface="+mn-lt"/>
-              </a:rPr>
-              <a:t>in the mean age-standardized death rate from respiratory infections per 100,000 people between countries.</a:t>
-            </a:r>
-            <a:r>
-              <a:rPr lang="en-GB" sz="2000" b="0" spc="0" dirty="0">
-                <a:latin typeface="+mn-lt"/>
-              </a:rPr>
+              <a:rPr lang="en-US" sz="2000" b="0" spc="0" dirty="0"/>
+              <a:t>There is no difference in the mean age-standardized death rate from respiratory infections per 100,000 people between</a:t>
+            </a:r>
+            <a:r>
+              <a:rPr lang="en-GB" sz="2000" b="0" spc="0" dirty="0"/>
+              <a:t> </a:t>
+            </a:r>
+            <a:r>
+              <a:rPr lang="en-IE" sz="2000" b="0" spc="0" dirty="0"/>
+              <a:t>two countries Guatemala and South Africa</a:t>
+            </a:r>
+            <a:r>
+              <a:rPr lang="en-US" sz="2000" b="0" spc="0" dirty="0"/>
+              <a:t>.</a:t>
+            </a:r>
+            <a:br>
+              <a:rPr lang="en-US" sz="2000" b="0" spc="0" dirty="0"/>
+            </a:br>
+            <a:r>
+              <a:rPr lang="en-GB" sz="2000" b="0" spc="0" dirty="0"/>
               <a:t/>
             </a:r>
             <a:br>
-              <a:rPr lang="en-GB" sz="2000" b="0" spc="0" dirty="0">
-                <a:latin typeface="+mn-lt"/>
-              </a:rPr>
+              <a:rPr lang="en-GB" sz="2000" b="0" spc="0" dirty="0"/>
             </a:br>
             <a:r>
-              <a:rPr lang="en-GB" sz="2000" b="0" spc="0" dirty="0">
-                <a:latin typeface="+mn-lt"/>
-              </a:rPr>
-              <a:t/>
-            </a:r>
-            <a:br>
-              <a:rPr lang="en-GB" sz="2000" b="0" spc="0" dirty="0">
-                <a:latin typeface="+mn-lt"/>
-              </a:rPr>
-            </a:br>
-            <a:r>
-              <a:rPr lang="en-GB" sz="2000" b="0" spc="0" dirty="0">
-                <a:latin typeface="+mn-lt"/>
-              </a:rPr>
+              <a:rPr lang="en-GB" sz="2000" b="0" spc="0" dirty="0"/>
               <a:t>2. Alternative hypothesis (H</a:t>
             </a:r>
             <a:r>
-              <a:rPr lang="en-GB" sz="2000" b="0" spc="0" baseline="-25000" dirty="0">
-                <a:latin typeface="+mn-lt"/>
-              </a:rPr>
+              <a:rPr lang="en-GB" sz="2000" b="0" spc="0" baseline="-25000" dirty="0"/>
               <a:t>1</a:t>
             </a:r>
             <a:r>
-              <a:rPr lang="en-GB" sz="2000" b="0" spc="0" dirty="0">
-                <a:latin typeface="+mn-lt"/>
-              </a:rPr>
+              <a:rPr lang="en-GB" sz="2000" b="0" spc="0" dirty="0"/>
               <a:t>); </a:t>
             </a:r>
             <a:r>
-              <a:rPr lang="en-US" sz="2000" b="0" spc="0" dirty="0">
-                <a:latin typeface="+mn-lt"/>
-              </a:rPr>
-              <a:t>There is a </a:t>
-            </a:r>
-            <a:r>
-              <a:rPr lang="en-US" sz="2000" b="0" spc="0" dirty="0" smtClean="0">
-                <a:latin typeface="+mn-lt"/>
-              </a:rPr>
-              <a:t>difference </a:t>
-            </a:r>
-            <a:r>
-              <a:rPr lang="en-US" sz="2000" b="0" spc="0" dirty="0">
-                <a:latin typeface="+mn-lt"/>
-              </a:rPr>
-              <a:t>in the mean age-standardized death rate from respiratory infections per 100,000 people between </a:t>
-            </a:r>
-            <a:r>
-              <a:rPr lang="en-US" sz="2000" b="0" spc="0" dirty="0" smtClean="0">
-                <a:latin typeface="+mn-lt"/>
-              </a:rPr>
-              <a:t>countries.</a:t>
+              <a:rPr lang="en-US" sz="2000" b="0" spc="0" dirty="0"/>
+              <a:t>There is a difference in the mean age-standardized death rate from respiratory infections per 100,000 people </a:t>
+            </a:r>
+            <a:r>
+              <a:rPr lang="en-IE" sz="2000" b="0" spc="0" dirty="0"/>
+              <a:t>two countries Guatemala and South Africa</a:t>
+            </a:r>
+            <a:r>
+              <a:rPr lang="en-US" sz="2000" b="0" spc="0" dirty="0"/>
+              <a:t>.</a:t>
             </a:r>
             <a:endParaRPr lang="en-GB" sz="2000" b="0" spc="0" dirty="0">
               <a:latin typeface="+mn-lt"/>
@@ -7200,6 +7146,23 @@
 </file>
 
 <file path=customXml/item1.xml><?xml version="1.0" encoding="utf-8"?>
+<p:properties xmlns:p="http://schemas.microsoft.com/office/2006/metadata/properties" xmlns:xsi="http://www.w3.org/2001/XMLSchema-instance" xmlns:pc="http://schemas.microsoft.com/office/infopath/2007/PartnerControls">
+  <documentManagement>
+    <Information xmlns="4ad138b4-2b68-4b70-945d-07f8f18b1c9a" xsi:nil="true"/>
+  </documentManagement>
+</p:properties>
+</file>
+
+<file path=customXml/item2.xml><?xml version="1.0" encoding="utf-8"?>
+<?mso-contentType ?>
+<FormTemplates xmlns="http://schemas.microsoft.com/sharepoint/v3/contenttype/forms">
+  <Display>DocumentLibraryForm</Display>
+  <Edit>DocumentLibraryForm</Edit>
+  <New>DocumentLibraryForm</New>
+</FormTemplates>
+</file>
+
+<file path=customXml/item3.xml><?xml version="1.0" encoding="utf-8"?>
 <ct:contentTypeSchema xmlns:ct="http://schemas.microsoft.com/office/2006/metadata/contentType" xmlns:ma="http://schemas.microsoft.com/office/2006/metadata/properties/metaAttributes" ct:_="" ma:_="" ma:contentTypeName="Document" ma:contentTypeID="0x01010026DBA85F447B164191BB36C258697B67" ma:contentTypeVersion="14" ma:contentTypeDescription="Create a new document." ma:contentTypeScope="" ma:versionID="ea511d05ca7f895fe9556935b5c9af34">
   <xsd:schema xmlns:xsd="http://www.w3.org/2001/XMLSchema" xmlns:xs="http://www.w3.org/2001/XMLSchema" xmlns:p="http://schemas.microsoft.com/office/2006/metadata/properties" xmlns:ns2="4ad138b4-2b68-4b70-945d-07f8f18b1c9a" xmlns:ns3="3c474641-ec36-472f-b125-6b1b0910eaa4" targetNamespace="http://schemas.microsoft.com/office/2006/metadata/properties" ma:root="true" ma:fieldsID="662270106d7a7e100bcac2c5f8d29899" ns2:_="" ns3:_="">
     <xsd:import namespace="4ad138b4-2b68-4b70-945d-07f8f18b1c9a"/>
@@ -7424,24 +7387,32 @@
 </ct:contentTypeSchema>
 </file>
 
-<file path=customXml/item2.xml><?xml version="1.0" encoding="utf-8"?>
-<?mso-contentType ?>
-<FormTemplates xmlns="http://schemas.microsoft.com/sharepoint/v3/contenttype/forms">
-  <Display>DocumentLibraryForm</Display>
-  <Edit>DocumentLibraryForm</Edit>
-  <New>DocumentLibraryForm</New>
-</FormTemplates>
+<file path=customXml/itemProps1.xml><?xml version="1.0" encoding="utf-8"?>
+<ds:datastoreItem xmlns:ds="http://schemas.openxmlformats.org/officeDocument/2006/customXml" ds:itemID="{EDD1FC41-23C7-41B0-B5F9-BF4CD38AD2ED}">
+  <ds:schemaRefs>
+    <ds:schemaRef ds:uri="http://schemas.microsoft.com/office/infopath/2007/PartnerControls"/>
+    <ds:schemaRef ds:uri="3c474641-ec36-472f-b125-6b1b0910eaa4"/>
+    <ds:schemaRef ds:uri="http://purl.org/dc/terms/"/>
+    <ds:schemaRef ds:uri="http://schemas.microsoft.com/office/2006/documentManagement/types"/>
+    <ds:schemaRef ds:uri="http://www.w3.org/XML/1998/namespace"/>
+    <ds:schemaRef ds:uri="http://purl.org/dc/elements/1.1/"/>
+    <ds:schemaRef ds:uri="http://schemas.openxmlformats.org/package/2006/metadata/core-properties"/>
+    <ds:schemaRef ds:uri="4ad138b4-2b68-4b70-945d-07f8f18b1c9a"/>
+    <ds:schemaRef ds:uri="http://schemas.microsoft.com/office/2006/metadata/properties"/>
+    <ds:schemaRef ds:uri="http://purl.org/dc/dcmitype/"/>
+  </ds:schemaRefs>
+</ds:datastoreItem>
 </file>
 
-<file path=customXml/item3.xml><?xml version="1.0" encoding="utf-8"?>
-<p:properties xmlns:p="http://schemas.microsoft.com/office/2006/metadata/properties" xmlns:xsi="http://www.w3.org/2001/XMLSchema-instance" xmlns:pc="http://schemas.microsoft.com/office/infopath/2007/PartnerControls">
-  <documentManagement>
-    <Information xmlns="4ad138b4-2b68-4b70-945d-07f8f18b1c9a" xsi:nil="true"/>
-  </documentManagement>
-</p:properties>
+<file path=customXml/itemProps2.xml><?xml version="1.0" encoding="utf-8"?>
+<ds:datastoreItem xmlns:ds="http://schemas.openxmlformats.org/officeDocument/2006/customXml" ds:itemID="{91C521DD-2673-4EE6-BB9B-DC5C3320FFBB}">
+  <ds:schemaRefs>
+    <ds:schemaRef ds:uri="http://schemas.microsoft.com/sharepoint/v3/contenttype/forms"/>
+  </ds:schemaRefs>
+</ds:datastoreItem>
 </file>
 
-<file path=customXml/itemProps1.xml><?xml version="1.0" encoding="utf-8"?>
+<file path=customXml/itemProps3.xml><?xml version="1.0" encoding="utf-8"?>
 <ds:datastoreItem xmlns:ds="http://schemas.openxmlformats.org/officeDocument/2006/customXml" ds:itemID="{421B8C57-903D-4D0E-8336-7B512F760CD1}">
   <ds:schemaRefs>
     <ds:schemaRef ds:uri="http://schemas.microsoft.com/office/2006/metadata/contentType"/>
@@ -7458,29 +7429,4 @@
     <ds:schemaRef ds:uri="http://schemas.microsoft.com/internal/obd"/>
   </ds:schemaRefs>
 </ds:datastoreItem>
-</file>
-
-<file path=customXml/itemProps2.xml><?xml version="1.0" encoding="utf-8"?>
-<ds:datastoreItem xmlns:ds="http://schemas.openxmlformats.org/officeDocument/2006/customXml" ds:itemID="{91C521DD-2673-4EE6-BB9B-DC5C3320FFBB}">
-  <ds:schemaRefs>
-    <ds:schemaRef ds:uri="http://schemas.microsoft.com/sharepoint/v3/contenttype/forms"/>
-  </ds:schemaRefs>
-</ds:datastoreItem>
-</file>
-
-<file path=customXml/itemProps3.xml><?xml version="1.0" encoding="utf-8"?>
-<ds:datastoreItem xmlns:ds="http://schemas.openxmlformats.org/officeDocument/2006/customXml" ds:itemID="{EDD1FC41-23C7-41B0-B5F9-BF4CD38AD2ED}">
-  <ds:schemaRefs>
-    <ds:schemaRef ds:uri="http://schemas.microsoft.com/office/infopath/2007/PartnerControls"/>
-    <ds:schemaRef ds:uri="3c474641-ec36-472f-b125-6b1b0910eaa4"/>
-    <ds:schemaRef ds:uri="http://purl.org/dc/terms/"/>
-    <ds:schemaRef ds:uri="http://schemas.microsoft.com/office/2006/documentManagement/types"/>
-    <ds:schemaRef ds:uri="http://www.w3.org/XML/1998/namespace"/>
-    <ds:schemaRef ds:uri="http://purl.org/dc/elements/1.1/"/>
-    <ds:schemaRef ds:uri="http://schemas.openxmlformats.org/package/2006/metadata/core-properties"/>
-    <ds:schemaRef ds:uri="4ad138b4-2b68-4b70-945d-07f8f18b1c9a"/>
-    <ds:schemaRef ds:uri="http://schemas.microsoft.com/office/2006/metadata/properties"/>
-    <ds:schemaRef ds:uri="http://purl.org/dc/dcmitype/"/>
-  </ds:schemaRefs>
-</ds:datastoreItem>
 </file>
</xml_diff>